<commit_message>
made comments in powerpoint
</commit_message>
<xml_diff>
--- a/Ethnicity.pptx
+++ b/Ethnicity.pptx
@@ -1,21 +1,21 @@
 
 <file path=ppt/presentation.xml><?xml version="1.0" encoding="utf-8"?>
-<p:presentation xmlns:a="http://schemas.openxmlformats.org/drawingml/2006/main" xmlns:p="http://schemas.openxmlformats.org/presentationml/2006/main" xmlns:r="http://schemas.openxmlformats.org/officeDocument/2006/relationships" saveSubsetFonts="1">
+<p:presentation xmlns:a="http://schemas.openxmlformats.org/drawingml/2006/main" xmlns:r="http://schemas.openxmlformats.org/officeDocument/2006/relationships" xmlns:p="http://schemas.openxmlformats.org/presentationml/2006/main" saveSubsetFonts="1">
   <p:sldMasterIdLst>
     <p:sldMasterId id="2147483648" r:id="rId1"/>
   </p:sldMasterIdLst>
   <p:sldIdLst>
-    <p:sldId id="256" r:id="rId6"/>
-    <p:sldId id="257" r:id="rId7"/>
-    <p:sldId id="258" r:id="rId8"/>
-    <p:sldId id="259" r:id="rId9"/>
-    <p:sldId id="260" r:id="rId10"/>
-    <p:sldId id="261" r:id="rId11"/>
-    <p:sldId id="262" r:id="rId12"/>
-    <p:sldId id="263" r:id="rId13"/>
-    <p:sldId id="264" r:id="rId14"/>
-    <p:sldId id="265" r:id="rId15"/>
-    <p:sldId id="266" r:id="rId16"/>
+    <p:sldId id="256" r:id="rId2"/>
+    <p:sldId id="257" r:id="rId3"/>
+    <p:sldId id="258" r:id="rId4"/>
+    <p:sldId id="259" r:id="rId5"/>
+    <p:sldId id="260" r:id="rId6"/>
+    <p:sldId id="261" r:id="rId7"/>
+    <p:sldId id="262" r:id="rId8"/>
+    <p:sldId id="263" r:id="rId9"/>
+    <p:sldId id="264" r:id="rId10"/>
+    <p:sldId id="265" r:id="rId11"/>
+    <p:sldId id="266" r:id="rId12"/>
   </p:sldIdLst>
   <p:sldSz cx="12192000" cy="6858000"/>
   <p:notesSz cx="6858000" cy="9144000"/>
@@ -23,8 +23,8 @@
     <a:defPPr>
       <a:defRPr lang="en-US"/>
     </a:defPPr>
-    <a:lvl1pPr algn="l" defTabSz="914400" eaLnBrk="1" hangingPunct="1" latinLnBrk="0" marL="0" rtl="0">
-      <a:defRPr kern="1200" sz="1800">
+    <a:lvl1pPr marL="0" algn="l" defTabSz="914400" rtl="0" eaLnBrk="1" latinLnBrk="0" hangingPunct="1">
+      <a:defRPr sz="1800" kern="1200">
         <a:solidFill>
           <a:schemeClr val="tx1"/>
         </a:solidFill>
@@ -33,8 +33,8 @@
         <a:cs typeface="+mn-cs"/>
       </a:defRPr>
     </a:lvl1pPr>
-    <a:lvl2pPr algn="l" defTabSz="914400" eaLnBrk="1" hangingPunct="1" latinLnBrk="0" marL="457200" rtl="0">
-      <a:defRPr kern="1200" sz="1800">
+    <a:lvl2pPr marL="457200" algn="l" defTabSz="914400" rtl="0" eaLnBrk="1" latinLnBrk="0" hangingPunct="1">
+      <a:defRPr sz="1800" kern="1200">
         <a:solidFill>
           <a:schemeClr val="tx1"/>
         </a:solidFill>
@@ -43,8 +43,8 @@
         <a:cs typeface="+mn-cs"/>
       </a:defRPr>
     </a:lvl2pPr>
-    <a:lvl3pPr algn="l" defTabSz="914400" eaLnBrk="1" hangingPunct="1" latinLnBrk="0" marL="914400" rtl="0">
-      <a:defRPr kern="1200" sz="1800">
+    <a:lvl3pPr marL="914400" algn="l" defTabSz="914400" rtl="0" eaLnBrk="1" latinLnBrk="0" hangingPunct="1">
+      <a:defRPr sz="1800" kern="1200">
         <a:solidFill>
           <a:schemeClr val="tx1"/>
         </a:solidFill>
@@ -53,8 +53,8 @@
         <a:cs typeface="+mn-cs"/>
       </a:defRPr>
     </a:lvl3pPr>
-    <a:lvl4pPr algn="l" defTabSz="914400" eaLnBrk="1" hangingPunct="1" latinLnBrk="0" marL="1371600" rtl="0">
-      <a:defRPr kern="1200" sz="1800">
+    <a:lvl4pPr marL="1371600" algn="l" defTabSz="914400" rtl="0" eaLnBrk="1" latinLnBrk="0" hangingPunct="1">
+      <a:defRPr sz="1800" kern="1200">
         <a:solidFill>
           <a:schemeClr val="tx1"/>
         </a:solidFill>
@@ -63,8 +63,8 @@
         <a:cs typeface="+mn-cs"/>
       </a:defRPr>
     </a:lvl4pPr>
-    <a:lvl5pPr algn="l" defTabSz="914400" eaLnBrk="1" hangingPunct="1" latinLnBrk="0" marL="1828800" rtl="0">
-      <a:defRPr kern="1200" sz="1800">
+    <a:lvl5pPr marL="1828800" algn="l" defTabSz="914400" rtl="0" eaLnBrk="1" latinLnBrk="0" hangingPunct="1">
+      <a:defRPr sz="1800" kern="1200">
         <a:solidFill>
           <a:schemeClr val="tx1"/>
         </a:solidFill>
@@ -73,8 +73,8 @@
         <a:cs typeface="+mn-cs"/>
       </a:defRPr>
     </a:lvl5pPr>
-    <a:lvl6pPr algn="l" defTabSz="914400" eaLnBrk="1" hangingPunct="1" latinLnBrk="0" marL="2286000" rtl="0">
-      <a:defRPr kern="1200" sz="1800">
+    <a:lvl6pPr marL="2286000" algn="l" defTabSz="914400" rtl="0" eaLnBrk="1" latinLnBrk="0" hangingPunct="1">
+      <a:defRPr sz="1800" kern="1200">
         <a:solidFill>
           <a:schemeClr val="tx1"/>
         </a:solidFill>
@@ -83,8 +83,8 @@
         <a:cs typeface="+mn-cs"/>
       </a:defRPr>
     </a:lvl6pPr>
-    <a:lvl7pPr algn="l" defTabSz="914400" eaLnBrk="1" hangingPunct="1" latinLnBrk="0" marL="2743200" rtl="0">
-      <a:defRPr kern="1200" sz="1800">
+    <a:lvl7pPr marL="2743200" algn="l" defTabSz="914400" rtl="0" eaLnBrk="1" latinLnBrk="0" hangingPunct="1">
+      <a:defRPr sz="1800" kern="1200">
         <a:solidFill>
           <a:schemeClr val="tx1"/>
         </a:solidFill>
@@ -93,8 +93,8 @@
         <a:cs typeface="+mn-cs"/>
       </a:defRPr>
     </a:lvl7pPr>
-    <a:lvl8pPr algn="l" defTabSz="914400" eaLnBrk="1" hangingPunct="1" latinLnBrk="0" marL="3200400" rtl="0">
-      <a:defRPr kern="1200" sz="1800">
+    <a:lvl8pPr marL="3200400" algn="l" defTabSz="914400" rtl="0" eaLnBrk="1" latinLnBrk="0" hangingPunct="1">
+      <a:defRPr sz="1800" kern="1200">
         <a:solidFill>
           <a:schemeClr val="tx1"/>
         </a:solidFill>
@@ -103,8 +103,8 @@
         <a:cs typeface="+mn-cs"/>
       </a:defRPr>
     </a:lvl8pPr>
-    <a:lvl9pPr algn="l" defTabSz="914400" eaLnBrk="1" hangingPunct="1" latinLnBrk="0" marL="3657600" rtl="0">
-      <a:defRPr kern="1200" sz="1800">
+    <a:lvl9pPr marL="3657600" algn="l" defTabSz="914400" rtl="0" eaLnBrk="1" latinLnBrk="0" hangingPunct="1">
+      <a:defRPr sz="1800" kern="1200">
         <a:solidFill>
           <a:schemeClr val="tx1"/>
         </a:solidFill>
@@ -114,6 +114,11 @@
       </a:defRPr>
     </a:lvl9pPr>
   </p:defaultTextStyle>
+  <p:extLst>
+    <p:ext uri="{EFAFB233-063F-42B5-8137-9DF3F51BA10A}">
+      <p15:sldGuideLst xmlns:p15="http://schemas.microsoft.com/office/powerpoint/2012/main"/>
+    </p:ext>
+  </p:extLst>
 </p:presentation>
 </file>
 
@@ -264,7 +269,7 @@
           <a:p>
             <a:fld id="{EED1C14C-A143-42F5-B247-D0E800131009}" type="datetimeFigureOut">
               <a:rPr lang="en-US" smtClean="0"/>
-              <a:t>8/15/2018</a:t>
+              <a:t>3/27/2023</a:t>
             </a:fld>
             <a:endParaRPr lang="en-US"/>
           </a:p>
@@ -462,7 +467,7 @@
           <a:p>
             <a:fld id="{EED1C14C-A143-42F5-B247-D0E800131009}" type="datetimeFigureOut">
               <a:rPr lang="en-US" smtClean="0"/>
-              <a:t>8/15/2018</a:t>
+              <a:t>3/27/2023</a:t>
             </a:fld>
             <a:endParaRPr lang="en-US"/>
           </a:p>
@@ -670,7 +675,7 @@
           <a:p>
             <a:fld id="{EED1C14C-A143-42F5-B247-D0E800131009}" type="datetimeFigureOut">
               <a:rPr lang="en-US" smtClean="0"/>
-              <a:t>8/15/2018</a:t>
+              <a:t>3/27/2023</a:t>
             </a:fld>
             <a:endParaRPr lang="en-US"/>
           </a:p>
@@ -868,7 +873,7 @@
           <a:p>
             <a:fld id="{EED1C14C-A143-42F5-B247-D0E800131009}" type="datetimeFigureOut">
               <a:rPr lang="en-US" smtClean="0"/>
-              <a:t>8/15/2018</a:t>
+              <a:t>3/27/2023</a:t>
             </a:fld>
             <a:endParaRPr lang="en-US"/>
           </a:p>
@@ -1143,7 +1148,7 @@
           <a:p>
             <a:fld id="{EED1C14C-A143-42F5-B247-D0E800131009}" type="datetimeFigureOut">
               <a:rPr lang="en-US" smtClean="0"/>
-              <a:t>8/15/2018</a:t>
+              <a:t>3/27/2023</a:t>
             </a:fld>
             <a:endParaRPr lang="en-US"/>
           </a:p>
@@ -1408,7 +1413,7 @@
           <a:p>
             <a:fld id="{EED1C14C-A143-42F5-B247-D0E800131009}" type="datetimeFigureOut">
               <a:rPr lang="en-US" smtClean="0"/>
-              <a:t>8/15/2018</a:t>
+              <a:t>3/27/2023</a:t>
             </a:fld>
             <a:endParaRPr lang="en-US"/>
           </a:p>
@@ -1820,7 +1825,7 @@
           <a:p>
             <a:fld id="{EED1C14C-A143-42F5-B247-D0E800131009}" type="datetimeFigureOut">
               <a:rPr lang="en-US" smtClean="0"/>
-              <a:t>8/15/2018</a:t>
+              <a:t>3/27/2023</a:t>
             </a:fld>
             <a:endParaRPr lang="en-US"/>
           </a:p>
@@ -1961,7 +1966,7 @@
           <a:p>
             <a:fld id="{EED1C14C-A143-42F5-B247-D0E800131009}" type="datetimeFigureOut">
               <a:rPr lang="en-US" smtClean="0"/>
-              <a:t>8/15/2018</a:t>
+              <a:t>3/27/2023</a:t>
             </a:fld>
             <a:endParaRPr lang="en-US"/>
           </a:p>
@@ -2074,7 +2079,7 @@
           <a:p>
             <a:fld id="{EED1C14C-A143-42F5-B247-D0E800131009}" type="datetimeFigureOut">
               <a:rPr lang="en-US" smtClean="0"/>
-              <a:t>8/15/2018</a:t>
+              <a:t>3/27/2023</a:t>
             </a:fld>
             <a:endParaRPr lang="en-US"/>
           </a:p>
@@ -2385,7 +2390,7 @@
           <a:p>
             <a:fld id="{EED1C14C-A143-42F5-B247-D0E800131009}" type="datetimeFigureOut">
               <a:rPr lang="en-US" smtClean="0"/>
-              <a:t>8/15/2018</a:t>
+              <a:t>3/27/2023</a:t>
             </a:fld>
             <a:endParaRPr lang="en-US"/>
           </a:p>
@@ -2673,7 +2678,7 @@
           <a:p>
             <a:fld id="{EED1C14C-A143-42F5-B247-D0E800131009}" type="datetimeFigureOut">
               <a:rPr lang="en-US" smtClean="0"/>
-              <a:t>8/15/2018</a:t>
+              <a:t>3/27/2023</a:t>
             </a:fld>
             <a:endParaRPr lang="en-US"/>
           </a:p>
@@ -2914,7 +2919,7 @@
           <a:p>
             <a:fld id="{EED1C14C-A143-42F5-B247-D0E800131009}" type="datetimeFigureOut">
               <a:rPr lang="en-US" smtClean="0"/>
-              <a:t>8/15/2018</a:t>
+              <a:t>3/27/2023</a:t>
             </a:fld>
             <a:endParaRPr lang="en-US"/>
           </a:p>
@@ -3315,7 +3320,7 @@
 </file>
 
 <file path=ppt/slides/slide1.xml><?xml version="1.0" encoding="utf-8"?>
-<p:sld xmlns:a="http://schemas.openxmlformats.org/drawingml/2006/main" xmlns:p="http://schemas.openxmlformats.org/presentationml/2006/main" xmlns:r="http://schemas.openxmlformats.org/officeDocument/2006/relationships">
+<p:sld xmlns:a="http://schemas.openxmlformats.org/drawingml/2006/main" xmlns:r="http://schemas.openxmlformats.org/officeDocument/2006/relationships" xmlns:p="http://schemas.openxmlformats.org/presentationml/2006/main">
   <p:cSld>
     <p:spTree>
       <p:nvGrpSpPr>
@@ -3333,7 +3338,7 @@
       </p:grpSpPr>
       <p:sp>
         <p:nvSpPr>
-          <p:cNvPr id="0" name="slide1">
+          <p:cNvPr id="2" name="slide1">
             <a:extLst>
               <a:ext uri="{FF2B5EF4-FFF2-40B4-BE49-F238E27FC236}">
                 <a16:creationId xmlns:a16="http://schemas.microsoft.com/office/drawing/2014/main" id="{184264C8-E224-4D80-B7F0-E3B58A0138BC}"/>
@@ -3344,7 +3349,7 @@
             <a:spLocks noGrp="1"/>
           </p:cNvSpPr>
           <p:nvPr>
-            <p:ph idx="0" type="ctrTitle"/>
+            <p:ph type="ctrTitle"/>
           </p:nvPr>
         </p:nvSpPr>
         <p:spPr/>
@@ -3353,8 +3358,8 @@
           <a:lstStyle/>
           <a:p>
             <a:r>
-              <a:rPr dirty="0" lang="en-us">
-                <a:hlinkClick r:id="rId6"/>
+              <a:rPr lang="en-us" dirty="0">
+                <a:hlinkClick r:id="rId2"/>
               </a:rPr>
               <a:t>Ethnic group bubble</a:t>
             </a:r>
@@ -3363,7 +3368,7 @@
       </p:sp>
       <p:sp>
         <p:nvSpPr>
-          <p:cNvPr id="1" name="slide1">
+          <p:cNvPr id="3" name="slide1">
             <a:extLst>
               <a:ext uri="{FF2B5EF4-FFF2-40B4-BE49-F238E27FC236}">
                 <a16:creationId xmlns:a16="http://schemas.microsoft.com/office/drawing/2014/main" id="{FDC64ADA-85F6-45EA-85B4-436D71F181A9}"/>
@@ -3374,7 +3379,7 @@
             <a:spLocks noGrp="1"/>
           </p:cNvSpPr>
           <p:nvPr>
-            <p:ph idx="1" type="subTitle"/>
+            <p:ph type="subTitle" idx="1"/>
           </p:nvPr>
         </p:nvSpPr>
         <p:spPr/>
@@ -3383,7 +3388,6 @@
           <a:lstStyle/>
           <a:p>
             <a:r>
-              <a:rPr/>
               <a:t>File created on: 3/27/2023 7:34:06 PM</a:t>
             </a:r>
           </a:p>
@@ -3403,7 +3407,7 @@
 </file>
 
 <file path=ppt/slides/slide10.xml><?xml version="1.0" encoding="utf-8"?>
-<p:sld xmlns:a="http://schemas.openxmlformats.org/drawingml/2006/main" xmlns:p="http://schemas.openxmlformats.org/presentationml/2006/main" xmlns:r="http://schemas.openxmlformats.org/officeDocument/2006/relationships">
+<p:sld xmlns:a="http://schemas.openxmlformats.org/drawingml/2006/main" xmlns:r="http://schemas.openxmlformats.org/officeDocument/2006/relationships" xmlns:p="http://schemas.openxmlformats.org/presentationml/2006/main">
   <p:cSld>
     <p:spTree>
       <p:nvGrpSpPr>
@@ -3421,7 +3425,7 @@
       </p:grpSpPr>
       <p:pic>
         <p:nvPicPr>
-          <p:cNvPr descr="Box Plot Excluding Most W. Euro Outliers Limited to $15,000" id="10" name="slide10">
+          <p:cNvPr id="10" name="slide10" descr="Box Plot Excluding Most W. Euro Outliers Limited to $15,000">
             <a:extLst>
               <a:ext uri="{FF2B5EF4-FFF2-40B4-BE49-F238E27FC236}">
                 <a16:creationId xmlns:a16="http://schemas.microsoft.com/office/drawing/2014/main" id="{67927504-4DC8-4A99-9957-A2E46BACD8BB}"/>
@@ -3434,7 +3438,7 @@
           <p:nvPr/>
         </p:nvPicPr>
         <p:blipFill>
-          <a:blip r:embed="rId15">
+          <a:blip r:embed="rId2">
             <a:extLst>
               <a:ext uri="{28A0092B-C50C-407E-A947-70E740481C1C}">
                 <a14:useLocalDpi xmlns:a14="http://schemas.microsoft.com/office/drawing/2010/main" val="0"/>
@@ -3447,7 +3451,7 @@
         </p:blipFill>
         <p:spPr>
           <a:xfrm>
-            <a:off x="0" y="564700"/>
+            <a:off x="0" y="1129401"/>
             <a:ext cx="12192000" cy="5728599"/>
           </a:xfrm>
           <a:prstGeom prst="rect">
@@ -3455,6 +3459,41 @@
           </a:prstGeom>
         </p:spPr>
       </p:pic>
+      <p:sp>
+        <p:nvSpPr>
+          <p:cNvPr id="2" name="TextBox 1">
+            <a:extLst>
+              <a:ext uri="{FF2B5EF4-FFF2-40B4-BE49-F238E27FC236}">
+                <a16:creationId xmlns:a16="http://schemas.microsoft.com/office/drawing/2014/main" id="{EEF0FC39-5CAA-A2B0-CF7A-0F23392870D3}"/>
+              </a:ext>
+            </a:extLst>
+          </p:cNvPr>
+          <p:cNvSpPr txBox="1"/>
+          <p:nvPr/>
+        </p:nvSpPr>
+        <p:spPr>
+          <a:xfrm>
+            <a:off x="537882" y="430306"/>
+            <a:ext cx="7207422" cy="369332"/>
+          </a:xfrm>
+          <a:prstGeom prst="rect">
+            <a:avLst/>
+          </a:prstGeom>
+          <a:noFill/>
+        </p:spPr>
+        <p:txBody>
+          <a:bodyPr wrap="none" rtlCol="0">
+            <a:spAutoFit/>
+          </a:bodyPr>
+          <a:lstStyle/>
+          <a:p>
+            <a:r>
+              <a:rPr lang="en-US" dirty="0"/>
+              <a:t>Box plot excluding most Western European outliers, and limited to $15,000.</a:t>
+            </a:r>
+          </a:p>
+        </p:txBody>
+      </p:sp>
     </p:spTree>
     <p:extLst>
       <p:ext uri="{BB962C8B-B14F-4D97-AF65-F5344CB8AC3E}">
@@ -3469,7 +3508,7 @@
 </file>
 
 <file path=ppt/slides/slide11.xml><?xml version="1.0" encoding="utf-8"?>
-<p:sld xmlns:a="http://schemas.openxmlformats.org/drawingml/2006/main" xmlns:p="http://schemas.openxmlformats.org/presentationml/2006/main" xmlns:r="http://schemas.openxmlformats.org/officeDocument/2006/relationships">
+<p:sld xmlns:a="http://schemas.openxmlformats.org/drawingml/2006/main" xmlns:r="http://schemas.openxmlformats.org/officeDocument/2006/relationships" xmlns:p="http://schemas.openxmlformats.org/presentationml/2006/main">
   <p:cSld>
     <p:spTree>
       <p:nvGrpSpPr>
@@ -3487,7 +3526,7 @@
       </p:grpSpPr>
       <p:pic>
         <p:nvPicPr>
-          <p:cNvPr descr="Top TEN contributors" id="11" name="slide11">
+          <p:cNvPr id="11" name="slide11" descr="Top TEN contributors">
             <a:extLst>
               <a:ext uri="{FF2B5EF4-FFF2-40B4-BE49-F238E27FC236}">
                 <a16:creationId xmlns:a16="http://schemas.microsoft.com/office/drawing/2014/main" id="{9885B897-74DD-4380-AF96-BE02699B04F7}"/>
@@ -3500,7 +3539,7 @@
           <p:nvPr/>
         </p:nvPicPr>
         <p:blipFill>
-          <a:blip r:embed="rId16">
+          <a:blip r:embed="rId2">
             <a:extLst>
               <a:ext uri="{28A0092B-C50C-407E-A947-70E740481C1C}">
                 <a14:useLocalDpi xmlns:a14="http://schemas.microsoft.com/office/drawing/2010/main" val="0"/>
@@ -3521,6 +3560,41 @@
           </a:prstGeom>
         </p:spPr>
       </p:pic>
+      <p:sp>
+        <p:nvSpPr>
+          <p:cNvPr id="2" name="TextBox 1">
+            <a:extLst>
+              <a:ext uri="{FF2B5EF4-FFF2-40B4-BE49-F238E27FC236}">
+                <a16:creationId xmlns:a16="http://schemas.microsoft.com/office/drawing/2014/main" id="{7CE9265C-D28A-8023-91C8-6DF1444251E1}"/>
+              </a:ext>
+            </a:extLst>
+          </p:cNvPr>
+          <p:cNvSpPr txBox="1"/>
+          <p:nvPr/>
+        </p:nvSpPr>
+        <p:spPr>
+          <a:xfrm>
+            <a:off x="735106" y="744071"/>
+            <a:ext cx="9774407" cy="369332"/>
+          </a:xfrm>
+          <a:prstGeom prst="rect">
+            <a:avLst/>
+          </a:prstGeom>
+          <a:noFill/>
+        </p:spPr>
+        <p:txBody>
+          <a:bodyPr wrap="none" rtlCol="0">
+            <a:spAutoFit/>
+          </a:bodyPr>
+          <a:lstStyle/>
+          <a:p>
+            <a:r>
+              <a:rPr lang="en-US" dirty="0"/>
+              <a:t>Important chart showing our top ten “contributors” or spenders in one group.  Store region is included.</a:t>
+            </a:r>
+          </a:p>
+        </p:txBody>
+      </p:sp>
     </p:spTree>
     <p:extLst>
       <p:ext uri="{BB962C8B-B14F-4D97-AF65-F5344CB8AC3E}">
@@ -3535,7 +3609,7 @@
 </file>
 
 <file path=ppt/slides/slide2.xml><?xml version="1.0" encoding="utf-8"?>
-<p:sld xmlns:a="http://schemas.openxmlformats.org/drawingml/2006/main" xmlns:p="http://schemas.openxmlformats.org/presentationml/2006/main" xmlns:r="http://schemas.openxmlformats.org/officeDocument/2006/relationships">
+<p:sld xmlns:a="http://schemas.openxmlformats.org/drawingml/2006/main" xmlns:r="http://schemas.openxmlformats.org/officeDocument/2006/relationships" xmlns:p="http://schemas.openxmlformats.org/presentationml/2006/main">
   <p:cSld>
     <p:spTree>
       <p:nvGrpSpPr>
@@ -3553,7 +3627,7 @@
       </p:grpSpPr>
       <p:pic>
         <p:nvPicPr>
-          <p:cNvPr descr="Liftetime Demand Non West" id="2" name="slide2">
+          <p:cNvPr id="2" name="slide2" descr="Liftetime Demand Non West">
             <a:extLst>
               <a:ext uri="{FF2B5EF4-FFF2-40B4-BE49-F238E27FC236}">
                 <a16:creationId xmlns:a16="http://schemas.microsoft.com/office/drawing/2014/main" id="{40F99C1F-3C7F-4EA5-ADE9-3F42DC25ADAD}"/>
@@ -3566,7 +3640,7 @@
           <p:nvPr/>
         </p:nvPicPr>
         <p:blipFill>
-          <a:blip r:embed="rId7">
+          <a:blip r:embed="rId2">
             <a:extLst>
               <a:ext uri="{28A0092B-C50C-407E-A947-70E740481C1C}">
                 <a14:useLocalDpi xmlns:a14="http://schemas.microsoft.com/office/drawing/2010/main" val="0"/>
@@ -3579,14 +3653,61 @@
         </p:blipFill>
         <p:spPr>
           <a:xfrm>
-            <a:off x="1449982" y="0"/>
-            <a:ext cx="9292035" cy="6858000"/>
+            <a:off x="3589131" y="0"/>
+            <a:ext cx="8381051" cy="6517341"/>
           </a:xfrm>
           <a:prstGeom prst="rect">
             <a:avLst/>
           </a:prstGeom>
         </p:spPr>
       </p:pic>
+      <p:sp>
+        <p:nvSpPr>
+          <p:cNvPr id="3" name="TextBox 2">
+            <a:extLst>
+              <a:ext uri="{FF2B5EF4-FFF2-40B4-BE49-F238E27FC236}">
+                <a16:creationId xmlns:a16="http://schemas.microsoft.com/office/drawing/2014/main" id="{C1FC0EEE-AB18-F202-C152-5D747C809C9F}"/>
+              </a:ext>
+            </a:extLst>
+          </p:cNvPr>
+          <p:cNvSpPr txBox="1"/>
+          <p:nvPr/>
+        </p:nvSpPr>
+        <p:spPr>
+          <a:xfrm>
+            <a:off x="591671" y="636494"/>
+            <a:ext cx="2973571" cy="923330"/>
+          </a:xfrm>
+          <a:prstGeom prst="rect">
+            <a:avLst/>
+          </a:prstGeom>
+          <a:noFill/>
+        </p:spPr>
+        <p:txBody>
+          <a:bodyPr wrap="none" rtlCol="0">
+            <a:spAutoFit/>
+          </a:bodyPr>
+          <a:lstStyle/>
+          <a:p>
+            <a:r>
+              <a:rPr lang="en-US" dirty="0"/>
+              <a:t>Removing the Western</a:t>
+            </a:r>
+          </a:p>
+          <a:p>
+            <a:r>
+              <a:rPr lang="en-US" dirty="0"/>
+              <a:t>European column, this chart</a:t>
+            </a:r>
+          </a:p>
+          <a:p>
+            <a:r>
+              <a:rPr lang="en-US" dirty="0"/>
+              <a:t>Shows the rest of the regions.</a:t>
+            </a:r>
+          </a:p>
+        </p:txBody>
+      </p:sp>
     </p:spTree>
     <p:extLst>
       <p:ext uri="{BB962C8B-B14F-4D97-AF65-F5344CB8AC3E}">
@@ -3601,7 +3722,7 @@
 </file>
 
 <file path=ppt/slides/slide3.xml><?xml version="1.0" encoding="utf-8"?>
-<p:sld xmlns:a="http://schemas.openxmlformats.org/drawingml/2006/main" xmlns:p="http://schemas.openxmlformats.org/presentationml/2006/main" xmlns:r="http://schemas.openxmlformats.org/officeDocument/2006/relationships">
+<p:sld xmlns:a="http://schemas.openxmlformats.org/drawingml/2006/main" xmlns:r="http://schemas.openxmlformats.org/officeDocument/2006/relationships" xmlns:p="http://schemas.openxmlformats.org/presentationml/2006/main">
   <p:cSld>
     <p:spTree>
       <p:nvGrpSpPr>
@@ -3619,7 +3740,7 @@
       </p:grpSpPr>
       <p:pic>
         <p:nvPicPr>
-          <p:cNvPr descr="Liftetime Demand Western Euro" id="3" name="slide3">
+          <p:cNvPr id="3" name="slide3" descr="Liftetime Demand Western Euro">
             <a:extLst>
               <a:ext uri="{FF2B5EF4-FFF2-40B4-BE49-F238E27FC236}">
                 <a16:creationId xmlns:a16="http://schemas.microsoft.com/office/drawing/2014/main" id="{9CB51C8A-C79F-4CD2-85F8-4012A48CBC52}"/>
@@ -3632,7 +3753,7 @@
           <p:nvPr/>
         </p:nvPicPr>
         <p:blipFill>
-          <a:blip r:embed="rId8">
+          <a:blip r:embed="rId2">
             <a:extLst>
               <a:ext uri="{28A0092B-C50C-407E-A947-70E740481C1C}">
                 <a14:useLocalDpi xmlns:a14="http://schemas.microsoft.com/office/drawing/2010/main" val="0"/>
@@ -3653,6 +3774,57 @@
           </a:prstGeom>
         </p:spPr>
       </p:pic>
+      <p:sp>
+        <p:nvSpPr>
+          <p:cNvPr id="2" name="TextBox 1">
+            <a:extLst>
+              <a:ext uri="{FF2B5EF4-FFF2-40B4-BE49-F238E27FC236}">
+                <a16:creationId xmlns:a16="http://schemas.microsoft.com/office/drawing/2014/main" id="{22D5F111-6C2C-0D33-C9FB-FEC56989B36B}"/>
+              </a:ext>
+            </a:extLst>
+          </p:cNvPr>
+          <p:cNvSpPr txBox="1"/>
+          <p:nvPr/>
+        </p:nvSpPr>
+        <p:spPr>
+          <a:xfrm>
+            <a:off x="313765" y="663388"/>
+            <a:ext cx="3129318" cy="923330"/>
+          </a:xfrm>
+          <a:prstGeom prst="rect">
+            <a:avLst/>
+          </a:prstGeom>
+          <a:noFill/>
+        </p:spPr>
+        <p:txBody>
+          <a:bodyPr wrap="none" rtlCol="0">
+            <a:spAutoFit/>
+          </a:bodyPr>
+          <a:lstStyle/>
+          <a:p>
+            <a:r>
+              <a:rPr lang="en-US" dirty="0"/>
+              <a:t>This chart shows ONLY Western</a:t>
+            </a:r>
+          </a:p>
+          <a:p>
+            <a:r>
+              <a:rPr lang="en-US" dirty="0"/>
+              <a:t>Europeans.  This region is over-</a:t>
+            </a:r>
+          </a:p>
+          <a:p>
+            <a:r>
+              <a:rPr lang="en-US" dirty="0" err="1"/>
+              <a:t>whemingly</a:t>
+            </a:r>
+            <a:r>
+              <a:rPr lang="en-US" dirty="0"/>
+              <a:t> high comparatively.</a:t>
+            </a:r>
+          </a:p>
+        </p:txBody>
+      </p:sp>
     </p:spTree>
     <p:extLst>
       <p:ext uri="{BB962C8B-B14F-4D97-AF65-F5344CB8AC3E}">
@@ -3667,7 +3839,7 @@
 </file>
 
 <file path=ppt/slides/slide4.xml><?xml version="1.0" encoding="utf-8"?>
-<p:sld xmlns:a="http://schemas.openxmlformats.org/drawingml/2006/main" xmlns:p="http://schemas.openxmlformats.org/presentationml/2006/main" xmlns:r="http://schemas.openxmlformats.org/officeDocument/2006/relationships">
+<p:sld xmlns:a="http://schemas.openxmlformats.org/drawingml/2006/main" xmlns:r="http://schemas.openxmlformats.org/officeDocument/2006/relationships" xmlns:p="http://schemas.openxmlformats.org/presentationml/2006/main">
   <p:cSld>
     <p:spTree>
       <p:nvGrpSpPr>
@@ -3685,7 +3857,7 @@
       </p:grpSpPr>
       <p:pic>
         <p:nvPicPr>
-          <p:cNvPr descr="Working with K Group" id="4" name="slide4">
+          <p:cNvPr id="4" name="slide4" descr="Working with K Group">
             <a:extLst>
               <a:ext uri="{FF2B5EF4-FFF2-40B4-BE49-F238E27FC236}">
                 <a16:creationId xmlns:a16="http://schemas.microsoft.com/office/drawing/2014/main" id="{F8380718-E85B-4E20-B334-1A0D8C84B116}"/>
@@ -3698,7 +3870,7 @@
           <p:nvPr/>
         </p:nvPicPr>
         <p:blipFill>
-          <a:blip r:embed="rId9">
+          <a:blip r:embed="rId2">
             <a:extLst>
               <a:ext uri="{28A0092B-C50C-407E-A947-70E740481C1C}">
                 <a14:useLocalDpi xmlns:a14="http://schemas.microsoft.com/office/drawing/2010/main" val="0"/>
@@ -3733,7 +3905,7 @@
 </file>
 
 <file path=ppt/slides/slide5.xml><?xml version="1.0" encoding="utf-8"?>
-<p:sld xmlns:a="http://schemas.openxmlformats.org/drawingml/2006/main" xmlns:p="http://schemas.openxmlformats.org/presentationml/2006/main" xmlns:r="http://schemas.openxmlformats.org/officeDocument/2006/relationships">
+<p:sld xmlns:a="http://schemas.openxmlformats.org/drawingml/2006/main" xmlns:r="http://schemas.openxmlformats.org/officeDocument/2006/relationships" xmlns:p="http://schemas.openxmlformats.org/presentationml/2006/main">
   <p:cSld>
     <p:spTree>
       <p:nvGrpSpPr>
@@ -3751,7 +3923,7 @@
       </p:grpSpPr>
       <p:pic>
         <p:nvPicPr>
-          <p:cNvPr descr="Lifetime Demand by Count" id="5" name="slide5">
+          <p:cNvPr id="5" name="slide5" descr="Lifetime Demand by Count">
             <a:extLst>
               <a:ext uri="{FF2B5EF4-FFF2-40B4-BE49-F238E27FC236}">
                 <a16:creationId xmlns:a16="http://schemas.microsoft.com/office/drawing/2014/main" id="{9B4F7848-A5A5-4A0C-9C70-B19DF0896B6D}"/>
@@ -3764,7 +3936,7 @@
           <p:nvPr/>
         </p:nvPicPr>
         <p:blipFill>
-          <a:blip r:embed="rId10">
+          <a:blip r:embed="rId2">
             <a:extLst>
               <a:ext uri="{28A0092B-C50C-407E-A947-70E740481C1C}">
                 <a14:useLocalDpi xmlns:a14="http://schemas.microsoft.com/office/drawing/2010/main" val="0"/>
@@ -3777,7 +3949,7 @@
         </p:blipFill>
         <p:spPr>
           <a:xfrm>
-            <a:off x="2171652" y="0"/>
+            <a:off x="3785299" y="71717"/>
             <a:ext cx="7848695" cy="6858000"/>
           </a:xfrm>
           <a:prstGeom prst="rect">
@@ -3799,7 +3971,7 @@
 </file>
 
 <file path=ppt/slides/slide6.xml><?xml version="1.0" encoding="utf-8"?>
-<p:sld xmlns:a="http://schemas.openxmlformats.org/drawingml/2006/main" xmlns:p="http://schemas.openxmlformats.org/presentationml/2006/main" xmlns:r="http://schemas.openxmlformats.org/officeDocument/2006/relationships">
+<p:sld xmlns:a="http://schemas.openxmlformats.org/drawingml/2006/main" xmlns:r="http://schemas.openxmlformats.org/officeDocument/2006/relationships" xmlns:p="http://schemas.openxmlformats.org/presentationml/2006/main">
   <p:cSld>
     <p:spTree>
       <p:nvGrpSpPr>
@@ -3817,7 +3989,7 @@
       </p:grpSpPr>
       <p:pic>
         <p:nvPicPr>
-          <p:cNvPr descr="Average Lifetime Demand" id="6" name="slide6">
+          <p:cNvPr id="6" name="slide6" descr="Average Lifetime Demand">
             <a:extLst>
               <a:ext uri="{FF2B5EF4-FFF2-40B4-BE49-F238E27FC236}">
                 <a16:creationId xmlns:a16="http://schemas.microsoft.com/office/drawing/2014/main" id="{CCCA11C2-885A-4AEB-8202-B6608E89E0DE}"/>
@@ -3830,7 +4002,7 @@
           <p:nvPr/>
         </p:nvPicPr>
         <p:blipFill>
-          <a:blip r:embed="rId11">
+          <a:blip r:embed="rId2">
             <a:extLst>
               <a:ext uri="{28A0092B-C50C-407E-A947-70E740481C1C}">
                 <a14:useLocalDpi xmlns:a14="http://schemas.microsoft.com/office/drawing/2010/main" val="0"/>
@@ -3843,7 +4015,7 @@
         </p:blipFill>
         <p:spPr>
           <a:xfrm>
-            <a:off x="2171652" y="0"/>
+            <a:off x="3444640" y="0"/>
             <a:ext cx="7848695" cy="6858000"/>
           </a:xfrm>
           <a:prstGeom prst="rect">
@@ -3851,6 +4023,53 @@
           </a:prstGeom>
         </p:spPr>
       </p:pic>
+      <p:sp>
+        <p:nvSpPr>
+          <p:cNvPr id="2" name="TextBox 1">
+            <a:extLst>
+              <a:ext uri="{FF2B5EF4-FFF2-40B4-BE49-F238E27FC236}">
+                <a16:creationId xmlns:a16="http://schemas.microsoft.com/office/drawing/2014/main" id="{36430CBE-71FC-F676-BD87-EAAB67391019}"/>
+              </a:ext>
+            </a:extLst>
+          </p:cNvPr>
+          <p:cNvSpPr txBox="1"/>
+          <p:nvPr/>
+        </p:nvSpPr>
+        <p:spPr>
+          <a:xfrm>
+            <a:off x="457200" y="717176"/>
+            <a:ext cx="2924455" cy="923330"/>
+          </a:xfrm>
+          <a:prstGeom prst="rect">
+            <a:avLst/>
+          </a:prstGeom>
+          <a:noFill/>
+        </p:spPr>
+        <p:txBody>
+          <a:bodyPr wrap="none" rtlCol="0">
+            <a:spAutoFit/>
+          </a:bodyPr>
+          <a:lstStyle/>
+          <a:p>
+            <a:r>
+              <a:rPr lang="en-US" dirty="0"/>
+              <a:t>When we average count out</a:t>
+            </a:r>
+          </a:p>
+          <a:p>
+            <a:r>
+              <a:rPr lang="en-US" dirty="0"/>
+              <a:t>we get a more balanced view</a:t>
+            </a:r>
+          </a:p>
+          <a:p>
+            <a:r>
+              <a:rPr lang="en-US" dirty="0"/>
+              <a:t>of lifetime demand.</a:t>
+            </a:r>
+          </a:p>
+        </p:txBody>
+      </p:sp>
     </p:spTree>
     <p:extLst>
       <p:ext uri="{BB962C8B-B14F-4D97-AF65-F5344CB8AC3E}">
@@ -3865,7 +4084,7 @@
 </file>
 
 <file path=ppt/slides/slide7.xml><?xml version="1.0" encoding="utf-8"?>
-<p:sld xmlns:a="http://schemas.openxmlformats.org/drawingml/2006/main" xmlns:p="http://schemas.openxmlformats.org/presentationml/2006/main" xmlns:r="http://schemas.openxmlformats.org/officeDocument/2006/relationships">
+<p:sld xmlns:a="http://schemas.openxmlformats.org/drawingml/2006/main" xmlns:r="http://schemas.openxmlformats.org/officeDocument/2006/relationships" xmlns:p="http://schemas.openxmlformats.org/presentationml/2006/main">
   <p:cSld>
     <p:spTree>
       <p:nvGrpSpPr>
@@ -3883,7 +4102,7 @@
       </p:grpSpPr>
       <p:pic>
         <p:nvPicPr>
-          <p:cNvPr descr="CLV Table" id="7" name="slide7">
+          <p:cNvPr id="7" name="slide7" descr="CLV Table">
             <a:extLst>
               <a:ext uri="{FF2B5EF4-FFF2-40B4-BE49-F238E27FC236}">
                 <a16:creationId xmlns:a16="http://schemas.microsoft.com/office/drawing/2014/main" id="{C00EDA31-9E2A-402C-8DD8-99246057E7F2}"/>
@@ -3896,7 +4115,7 @@
           <p:nvPr/>
         </p:nvPicPr>
         <p:blipFill>
-          <a:blip r:embed="rId12">
+          <a:blip r:embed="rId2">
             <a:extLst>
               <a:ext uri="{28A0092B-C50C-407E-A947-70E740481C1C}">
                 <a14:useLocalDpi xmlns:a14="http://schemas.microsoft.com/office/drawing/2010/main" val="0"/>
@@ -3917,6 +4136,81 @@
           </a:prstGeom>
         </p:spPr>
       </p:pic>
+      <p:sp>
+        <p:nvSpPr>
+          <p:cNvPr id="2" name="TextBox 1">
+            <a:extLst>
+              <a:ext uri="{FF2B5EF4-FFF2-40B4-BE49-F238E27FC236}">
+                <a16:creationId xmlns:a16="http://schemas.microsoft.com/office/drawing/2014/main" id="{35CC85E7-2ED0-AC9E-4E1B-62D8DAC32B00}"/>
+              </a:ext>
+            </a:extLst>
+          </p:cNvPr>
+          <p:cNvSpPr txBox="1"/>
+          <p:nvPr/>
+        </p:nvSpPr>
+        <p:spPr>
+          <a:xfrm>
+            <a:off x="690282" y="1201271"/>
+            <a:ext cx="3471848" cy="2031325"/>
+          </a:xfrm>
+          <a:prstGeom prst="rect">
+            <a:avLst/>
+          </a:prstGeom>
+          <a:noFill/>
+        </p:spPr>
+        <p:txBody>
+          <a:bodyPr wrap="none" rtlCol="0">
+            <a:spAutoFit/>
+          </a:bodyPr>
+          <a:lstStyle/>
+          <a:p>
+            <a:r>
+              <a:rPr lang="en-US" dirty="0"/>
+              <a:t>Chart shows the totals of the so-</a:t>
+            </a:r>
+          </a:p>
+          <a:p>
+            <a:r>
+              <a:rPr lang="en-US" dirty="0"/>
+              <a:t>Called “Champion” spenders.  </a:t>
+            </a:r>
+          </a:p>
+          <a:p>
+            <a:r>
+              <a:rPr lang="en-US" dirty="0"/>
+              <a:t>The company could focus more on</a:t>
+            </a:r>
+          </a:p>
+          <a:p>
+            <a:r>
+              <a:rPr lang="en-US" dirty="0"/>
+              <a:t>The Hibernators and the Need </a:t>
+            </a:r>
+          </a:p>
+          <a:p>
+            <a:r>
+              <a:rPr lang="en-US" dirty="0"/>
+              <a:t>Attention groups going forward.</a:t>
+            </a:r>
+          </a:p>
+          <a:p>
+            <a:r>
+              <a:rPr lang="en-US" dirty="0"/>
+              <a:t>“CLV” stands for </a:t>
+            </a:r>
+            <a:r>
+              <a:rPr lang="en-US" i="1" dirty="0"/>
+              <a:t>Customer Lifetime</a:t>
+            </a:r>
+          </a:p>
+          <a:p>
+            <a:r>
+              <a:rPr lang="en-US" i="1" dirty="0"/>
+              <a:t>Value.</a:t>
+            </a:r>
+          </a:p>
+        </p:txBody>
+      </p:sp>
     </p:spTree>
     <p:extLst>
       <p:ext uri="{BB962C8B-B14F-4D97-AF65-F5344CB8AC3E}">
@@ -3931,7 +4225,7 @@
 </file>
 
 <file path=ppt/slides/slide8.xml><?xml version="1.0" encoding="utf-8"?>
-<p:sld xmlns:a="http://schemas.openxmlformats.org/drawingml/2006/main" xmlns:p="http://schemas.openxmlformats.org/presentationml/2006/main" xmlns:r="http://schemas.openxmlformats.org/officeDocument/2006/relationships">
+<p:sld xmlns:a="http://schemas.openxmlformats.org/drawingml/2006/main" xmlns:r="http://schemas.openxmlformats.org/officeDocument/2006/relationships" xmlns:p="http://schemas.openxmlformats.org/presentationml/2006/main">
   <p:cSld>
     <p:spTree>
       <p:nvGrpSpPr>
@@ -3949,7 +4243,7 @@
       </p:grpSpPr>
       <p:pic>
         <p:nvPicPr>
-          <p:cNvPr descr="Ave. Vist" id="8" name="slide8">
+          <p:cNvPr id="8" name="slide8" descr="Ave. Vist">
             <a:extLst>
               <a:ext uri="{FF2B5EF4-FFF2-40B4-BE49-F238E27FC236}">
                 <a16:creationId xmlns:a16="http://schemas.microsoft.com/office/drawing/2014/main" id="{DED95233-C7C1-47F2-957A-39BDD229C759}"/>
@@ -3962,7 +4256,7 @@
           <p:nvPr/>
         </p:nvPicPr>
         <p:blipFill>
-          <a:blip r:embed="rId13">
+          <a:blip r:embed="rId2">
             <a:extLst>
               <a:ext uri="{28A0092B-C50C-407E-A947-70E740481C1C}">
                 <a14:useLocalDpi xmlns:a14="http://schemas.microsoft.com/office/drawing/2010/main" val="0"/>
@@ -3975,7 +4269,7 @@
         </p:blipFill>
         <p:spPr>
           <a:xfrm>
-            <a:off x="0" y="827997"/>
+            <a:off x="0" y="1655994"/>
             <a:ext cx="12192000" cy="5202006"/>
           </a:xfrm>
           <a:prstGeom prst="rect">
@@ -3983,6 +4277,62 @@
           </a:prstGeom>
         </p:spPr>
       </p:pic>
+      <p:sp>
+        <p:nvSpPr>
+          <p:cNvPr id="2" name="TextBox 1">
+            <a:extLst>
+              <a:ext uri="{FF2B5EF4-FFF2-40B4-BE49-F238E27FC236}">
+                <a16:creationId xmlns:a16="http://schemas.microsoft.com/office/drawing/2014/main" id="{BC35F739-AAA9-C10F-2246-3D3A30FDB95C}"/>
+              </a:ext>
+            </a:extLst>
+          </p:cNvPr>
+          <p:cNvSpPr txBox="1"/>
+          <p:nvPr/>
+        </p:nvSpPr>
+        <p:spPr>
+          <a:xfrm>
+            <a:off x="331694" y="654424"/>
+            <a:ext cx="9571338" cy="923330"/>
+          </a:xfrm>
+          <a:prstGeom prst="rect">
+            <a:avLst/>
+          </a:prstGeom>
+          <a:noFill/>
+        </p:spPr>
+        <p:txBody>
+          <a:bodyPr wrap="none" rtlCol="0">
+            <a:spAutoFit/>
+          </a:bodyPr>
+          <a:lstStyle/>
+          <a:p>
+            <a:r>
+              <a:rPr lang="en-US" dirty="0"/>
+              <a:t>This grouping and bar chart intends to show the distribution of the separate groups who are in the </a:t>
+            </a:r>
+          </a:p>
+          <a:p>
+            <a:r>
+              <a:rPr lang="en-US" dirty="0"/>
+              <a:t>BG/NBD (Beta Geometric/Negative Binomial Distribution Model for Predicting Number of Purchase. </a:t>
+            </a:r>
+          </a:p>
+          <a:p>
+            <a:r>
+              <a:rPr lang="en-US" dirty="0"/>
+              <a:t>This model is a popular model in the </a:t>
+            </a:r>
+            <a:r>
+              <a:rPr lang="en-US" i="1" dirty="0"/>
+              <a:t>retail industry</a:t>
+            </a:r>
+            <a:r>
+              <a:rPr lang="en-US" dirty="0"/>
+              <a:t> today.</a:t>
+            </a:r>
+            <a:endParaRPr lang="en-US" i="1" dirty="0"/>
+          </a:p>
+        </p:txBody>
+      </p:sp>
     </p:spTree>
     <p:extLst>
       <p:ext uri="{BB962C8B-B14F-4D97-AF65-F5344CB8AC3E}">
@@ -3997,7 +4347,7 @@
 </file>
 
 <file path=ppt/slides/slide9.xml><?xml version="1.0" encoding="utf-8"?>
-<p:sld xmlns:a="http://schemas.openxmlformats.org/drawingml/2006/main" xmlns:p="http://schemas.openxmlformats.org/presentationml/2006/main" xmlns:r="http://schemas.openxmlformats.org/officeDocument/2006/relationships">
+<p:sld xmlns:a="http://schemas.openxmlformats.org/drawingml/2006/main" xmlns:r="http://schemas.openxmlformats.org/officeDocument/2006/relationships" xmlns:p="http://schemas.openxmlformats.org/presentationml/2006/main">
   <p:cSld>
     <p:spTree>
       <p:nvGrpSpPr>
@@ -4015,7 +4365,7 @@
       </p:grpSpPr>
       <p:pic>
         <p:nvPicPr>
-          <p:cNvPr descr="Top contributors (Western Europeans)" id="9" name="slide9">
+          <p:cNvPr id="9" name="slide9" descr="Top contributors (Western Europeans)">
             <a:extLst>
               <a:ext uri="{FF2B5EF4-FFF2-40B4-BE49-F238E27FC236}">
                 <a16:creationId xmlns:a16="http://schemas.microsoft.com/office/drawing/2014/main" id="{C90776FE-577B-46D2-AA6B-1800861DDC30}"/>
@@ -4028,7 +4378,7 @@
           <p:nvPr/>
         </p:nvPicPr>
         <p:blipFill>
-          <a:blip r:embed="rId14">
+          <a:blip r:embed="rId2">
             <a:extLst>
               <a:ext uri="{28A0092B-C50C-407E-A947-70E740481C1C}">
                 <a14:useLocalDpi xmlns:a14="http://schemas.microsoft.com/office/drawing/2010/main" val="0"/>
@@ -4041,7 +4391,7 @@
         </p:blipFill>
         <p:spPr>
           <a:xfrm>
-            <a:off x="0" y="795816"/>
+            <a:off x="62753" y="1591634"/>
             <a:ext cx="12192000" cy="5266366"/>
           </a:xfrm>
           <a:prstGeom prst="rect">
@@ -4049,36 +4399,41 @@
           </a:prstGeom>
         </p:spPr>
       </p:pic>
-    </p:spTree>
-    <p:extLst>
-      <p:ext uri="{BB962C8B-B14F-4D97-AF65-F5344CB8AC3E}">
-        <p14:creationId xmlns:p14="http://schemas.microsoft.com/office/powerpoint/2010/main" val="95992585"/>
-      </p:ext>
-    </p:extLst>
-  </p:cSld>
-  <p:clrMapOvr>
-    <a:masterClrMapping/>
-  </p:clrMapOvr>
-</p:sld>
-</file>
-
-<file path=ppt/slides/slideTemplate.xml><?xml version="1.0" encoding="utf-8"?>
-<p:sld xmlns:a="http://schemas.openxmlformats.org/drawingml/2006/main" xmlns:r="http://schemas.openxmlformats.org/officeDocument/2006/relationships" xmlns:p="http://schemas.openxmlformats.org/presentationml/2006/main">
-  <p:cSld>
-    <p:spTree>
-      <p:nvGrpSpPr>
-        <p:cNvPr id="1" name=""/>
-        <p:cNvGrpSpPr/>
-        <p:nvPr/>
-      </p:nvGrpSpPr>
-      <p:grpSpPr>
-        <a:xfrm>
-          <a:off x="0" y="0"/>
-          <a:ext cx="0" cy="0"/>
-          <a:chOff x="0" y="0"/>
-          <a:chExt cx="0" cy="0"/>
-        </a:xfrm>
-      </p:grpSpPr>
+      <p:sp>
+        <p:nvSpPr>
+          <p:cNvPr id="2" name="TextBox 1">
+            <a:extLst>
+              <a:ext uri="{FF2B5EF4-FFF2-40B4-BE49-F238E27FC236}">
+                <a16:creationId xmlns:a16="http://schemas.microsoft.com/office/drawing/2014/main" id="{2B19A458-990E-566A-0621-060936D8DD44}"/>
+              </a:ext>
+            </a:extLst>
+          </p:cNvPr>
+          <p:cNvSpPr txBox="1"/>
+          <p:nvPr/>
+        </p:nvSpPr>
+        <p:spPr>
+          <a:xfrm>
+            <a:off x="573741" y="403412"/>
+            <a:ext cx="9073766" cy="369332"/>
+          </a:xfrm>
+          <a:prstGeom prst="rect">
+            <a:avLst/>
+          </a:prstGeom>
+          <a:noFill/>
+        </p:spPr>
+        <p:txBody>
+          <a:bodyPr wrap="none" rtlCol="0">
+            <a:spAutoFit/>
+          </a:bodyPr>
+          <a:lstStyle/>
+          <a:p>
+            <a:r>
+              <a:rPr lang="en-US" dirty="0"/>
+              <a:t>The top ten spenders or “Champions” are in red here, showing the distribution by store region.</a:t>
+            </a:r>
+          </a:p>
+        </p:txBody>
+      </p:sp>
     </p:spTree>
     <p:extLst>
       <p:ext uri="{BB962C8B-B14F-4D97-AF65-F5344CB8AC3E}">

</xml_diff>

<commit_message>
changed first slide in powerpoint
</commit_message>
<xml_diff>
--- a/Ethnicity.pptx
+++ b/Ethnicity.pptx
@@ -3322,6 +3322,17 @@
 <file path=ppt/slides/slide1.xml><?xml version="1.0" encoding="utf-8"?>
 <p:sld xmlns:a="http://schemas.openxmlformats.org/drawingml/2006/main" xmlns:r="http://schemas.openxmlformats.org/officeDocument/2006/relationships" xmlns:p="http://schemas.openxmlformats.org/presentationml/2006/main">
   <p:cSld>
+    <p:bg>
+      <p:bgPr>
+        <a:solidFill>
+          <a:schemeClr val="accent4">
+            <a:lumMod val="60000"/>
+            <a:lumOff val="40000"/>
+          </a:schemeClr>
+        </a:solidFill>
+        <a:effectLst/>
+      </p:bgPr>
+    </p:bg>
     <p:spTree>
       <p:nvGrpSpPr>
         <p:cNvPr id="1" name=""/>
@@ -3354,15 +3365,55 @@
         </p:nvSpPr>
         <p:spPr/>
         <p:txBody>
-          <a:bodyPr/>
-          <a:lstStyle/>
-          <a:p>
-            <a:r>
-              <a:rPr lang="en-us" dirty="0">
+          <a:bodyPr>
+            <a:normAutofit fontScale="90000"/>
+          </a:bodyPr>
+          <a:lstStyle/>
+          <a:p>
+            <a:r>
+              <a:rPr lang="en-US" dirty="0">
+                <a:latin typeface="Amasis MT Pro Black" panose="020B0604020202020204" pitchFamily="18" charset="0"/>
                 <a:hlinkClick r:id="rId2"/>
               </a:rPr>
-              <a:t>Ethnic group bubble</a:t>
-            </a:r>
+              <a:t>E</a:t>
+            </a:r>
+            <a:r>
+              <a:rPr lang="en-us" dirty="0">
+                <a:latin typeface="Amasis MT Pro Black" panose="020B0604020202020204" pitchFamily="18" charset="0"/>
+                <a:hlinkClick r:id="rId2"/>
+              </a:rPr>
+              <a:t>thnicity </a:t>
+            </a:r>
+            <a:br>
+              <a:rPr lang="en-us" dirty="0">
+                <a:latin typeface="Amasis MT Pro Black" panose="020B0604020202020204" pitchFamily="18" charset="0"/>
+                <a:hlinkClick r:id="rId2"/>
+              </a:rPr>
+            </a:br>
+            <a:r>
+              <a:rPr lang="en-US" dirty="0">
+                <a:latin typeface="Amasis MT Pro Black" panose="020B0604020202020204" pitchFamily="18" charset="0"/>
+                <a:hlinkClick r:id="rId2"/>
+              </a:rPr>
+              <a:t>And </a:t>
+            </a:r>
+            <a:br>
+              <a:rPr lang="en-US" dirty="0">
+                <a:latin typeface="Amasis MT Pro Black" panose="020B0604020202020204" pitchFamily="18" charset="0"/>
+                <a:hlinkClick r:id="rId2"/>
+              </a:rPr>
+            </a:br>
+            <a:r>
+              <a:rPr lang="en-US" dirty="0">
+                <a:latin typeface="Amasis MT Pro Black" panose="020B0604020202020204" pitchFamily="18" charset="0"/>
+                <a:hlinkClick r:id="rId2"/>
+              </a:rPr>
+              <a:t>Spend</a:t>
+            </a:r>
+            <a:endParaRPr lang="en-us" dirty="0">
+              <a:latin typeface="Amasis MT Pro Black" panose="020B0604020202020204" pitchFamily="18" charset="0"/>
+              <a:hlinkClick r:id="rId2"/>
+            </a:endParaRPr>
           </a:p>
         </p:txBody>
       </p:sp>
@@ -3388,6 +3439,7 @@
           <a:lstStyle/>
           <a:p>
             <a:r>
+              <a:rPr dirty="0"/>
               <a:t>File created on: 3/27/2023 7:34:06 PM</a:t>
             </a:r>
           </a:p>

</xml_diff>

<commit_message>
changed my slides color to green
</commit_message>
<xml_diff>
--- a/Ethnicity.pptx
+++ b/Ethnicity.pptx
@@ -1,21 +1,21 @@
 
 <file path=ppt/presentation.xml><?xml version="1.0" encoding="utf-8"?>
-<p:presentation xmlns:a="http://schemas.openxmlformats.org/drawingml/2006/main" xmlns:r="http://schemas.openxmlformats.org/officeDocument/2006/relationships" xmlns:p="http://schemas.openxmlformats.org/presentationml/2006/main" saveSubsetFonts="1">
+<p:presentation xmlns:a="http://schemas.openxmlformats.org/drawingml/2006/main" xmlns:p="http://schemas.openxmlformats.org/presentationml/2006/main" xmlns:r="http://schemas.openxmlformats.org/officeDocument/2006/relationships" saveSubsetFonts="1">
   <p:sldMasterIdLst>
     <p:sldMasterId id="2147483648" r:id="rId1"/>
   </p:sldMasterIdLst>
   <p:sldIdLst>
-    <p:sldId id="256" r:id="rId2"/>
-    <p:sldId id="257" r:id="rId3"/>
-    <p:sldId id="258" r:id="rId4"/>
-    <p:sldId id="259" r:id="rId5"/>
-    <p:sldId id="260" r:id="rId6"/>
-    <p:sldId id="261" r:id="rId7"/>
-    <p:sldId id="262" r:id="rId8"/>
-    <p:sldId id="263" r:id="rId9"/>
-    <p:sldId id="264" r:id="rId10"/>
-    <p:sldId id="265" r:id="rId11"/>
-    <p:sldId id="266" r:id="rId12"/>
+    <p:sldId id="256" r:id="rId6"/>
+    <p:sldId id="257" r:id="rId7"/>
+    <p:sldId id="258" r:id="rId8"/>
+    <p:sldId id="259" r:id="rId9"/>
+    <p:sldId id="260" r:id="rId10"/>
+    <p:sldId id="261" r:id="rId11"/>
+    <p:sldId id="262" r:id="rId12"/>
+    <p:sldId id="263" r:id="rId13"/>
+    <p:sldId id="264" r:id="rId14"/>
+    <p:sldId id="265" r:id="rId15"/>
+    <p:sldId id="266" r:id="rId16"/>
   </p:sldIdLst>
   <p:sldSz cx="12192000" cy="6858000"/>
   <p:notesSz cx="6858000" cy="9144000"/>
@@ -23,8 +23,8 @@
     <a:defPPr>
       <a:defRPr lang="en-US"/>
     </a:defPPr>
-    <a:lvl1pPr marL="0" algn="l" defTabSz="914400" rtl="0" eaLnBrk="1" latinLnBrk="0" hangingPunct="1">
-      <a:defRPr sz="1800" kern="1200">
+    <a:lvl1pPr algn="l" defTabSz="914400" eaLnBrk="1" hangingPunct="1" latinLnBrk="0" marL="0" rtl="0">
+      <a:defRPr kern="1200" sz="1800">
         <a:solidFill>
           <a:schemeClr val="tx1"/>
         </a:solidFill>
@@ -33,8 +33,8 @@
         <a:cs typeface="+mn-cs"/>
       </a:defRPr>
     </a:lvl1pPr>
-    <a:lvl2pPr marL="457200" algn="l" defTabSz="914400" rtl="0" eaLnBrk="1" latinLnBrk="0" hangingPunct="1">
-      <a:defRPr sz="1800" kern="1200">
+    <a:lvl2pPr algn="l" defTabSz="914400" eaLnBrk="1" hangingPunct="1" latinLnBrk="0" marL="457200" rtl="0">
+      <a:defRPr kern="1200" sz="1800">
         <a:solidFill>
           <a:schemeClr val="tx1"/>
         </a:solidFill>
@@ -43,8 +43,8 @@
         <a:cs typeface="+mn-cs"/>
       </a:defRPr>
     </a:lvl2pPr>
-    <a:lvl3pPr marL="914400" algn="l" defTabSz="914400" rtl="0" eaLnBrk="1" latinLnBrk="0" hangingPunct="1">
-      <a:defRPr sz="1800" kern="1200">
+    <a:lvl3pPr algn="l" defTabSz="914400" eaLnBrk="1" hangingPunct="1" latinLnBrk="0" marL="914400" rtl="0">
+      <a:defRPr kern="1200" sz="1800">
         <a:solidFill>
           <a:schemeClr val="tx1"/>
         </a:solidFill>
@@ -53,8 +53,8 @@
         <a:cs typeface="+mn-cs"/>
       </a:defRPr>
     </a:lvl3pPr>
-    <a:lvl4pPr marL="1371600" algn="l" defTabSz="914400" rtl="0" eaLnBrk="1" latinLnBrk="0" hangingPunct="1">
-      <a:defRPr sz="1800" kern="1200">
+    <a:lvl4pPr algn="l" defTabSz="914400" eaLnBrk="1" hangingPunct="1" latinLnBrk="0" marL="1371600" rtl="0">
+      <a:defRPr kern="1200" sz="1800">
         <a:solidFill>
           <a:schemeClr val="tx1"/>
         </a:solidFill>
@@ -63,8 +63,8 @@
         <a:cs typeface="+mn-cs"/>
       </a:defRPr>
     </a:lvl4pPr>
-    <a:lvl5pPr marL="1828800" algn="l" defTabSz="914400" rtl="0" eaLnBrk="1" latinLnBrk="0" hangingPunct="1">
-      <a:defRPr sz="1800" kern="1200">
+    <a:lvl5pPr algn="l" defTabSz="914400" eaLnBrk="1" hangingPunct="1" latinLnBrk="0" marL="1828800" rtl="0">
+      <a:defRPr kern="1200" sz="1800">
         <a:solidFill>
           <a:schemeClr val="tx1"/>
         </a:solidFill>
@@ -73,8 +73,8 @@
         <a:cs typeface="+mn-cs"/>
       </a:defRPr>
     </a:lvl5pPr>
-    <a:lvl6pPr marL="2286000" algn="l" defTabSz="914400" rtl="0" eaLnBrk="1" latinLnBrk="0" hangingPunct="1">
-      <a:defRPr sz="1800" kern="1200">
+    <a:lvl6pPr algn="l" defTabSz="914400" eaLnBrk="1" hangingPunct="1" latinLnBrk="0" marL="2286000" rtl="0">
+      <a:defRPr kern="1200" sz="1800">
         <a:solidFill>
           <a:schemeClr val="tx1"/>
         </a:solidFill>
@@ -83,8 +83,8 @@
         <a:cs typeface="+mn-cs"/>
       </a:defRPr>
     </a:lvl6pPr>
-    <a:lvl7pPr marL="2743200" algn="l" defTabSz="914400" rtl="0" eaLnBrk="1" latinLnBrk="0" hangingPunct="1">
-      <a:defRPr sz="1800" kern="1200">
+    <a:lvl7pPr algn="l" defTabSz="914400" eaLnBrk="1" hangingPunct="1" latinLnBrk="0" marL="2743200" rtl="0">
+      <a:defRPr kern="1200" sz="1800">
         <a:solidFill>
           <a:schemeClr val="tx1"/>
         </a:solidFill>
@@ -93,8 +93,8 @@
         <a:cs typeface="+mn-cs"/>
       </a:defRPr>
     </a:lvl7pPr>
-    <a:lvl8pPr marL="3200400" algn="l" defTabSz="914400" rtl="0" eaLnBrk="1" latinLnBrk="0" hangingPunct="1">
-      <a:defRPr sz="1800" kern="1200">
+    <a:lvl8pPr algn="l" defTabSz="914400" eaLnBrk="1" hangingPunct="1" latinLnBrk="0" marL="3200400" rtl="0">
+      <a:defRPr kern="1200" sz="1800">
         <a:solidFill>
           <a:schemeClr val="tx1"/>
         </a:solidFill>
@@ -103,8 +103,8 @@
         <a:cs typeface="+mn-cs"/>
       </a:defRPr>
     </a:lvl8pPr>
-    <a:lvl9pPr marL="3657600" algn="l" defTabSz="914400" rtl="0" eaLnBrk="1" latinLnBrk="0" hangingPunct="1">
-      <a:defRPr sz="1800" kern="1200">
+    <a:lvl9pPr algn="l" defTabSz="914400" eaLnBrk="1" hangingPunct="1" latinLnBrk="0" marL="3657600" rtl="0">
+      <a:defRPr kern="1200" sz="1800">
         <a:solidFill>
           <a:schemeClr val="tx1"/>
         </a:solidFill>
@@ -114,11 +114,6 @@
       </a:defRPr>
     </a:lvl9pPr>
   </p:defaultTextStyle>
-  <p:extLst>
-    <p:ext uri="{EFAFB233-063F-42B5-8137-9DF3F51BA10A}">
-      <p15:sldGuideLst xmlns:p15="http://schemas.microsoft.com/office/powerpoint/2012/main"/>
-    </p:ext>
-  </p:extLst>
 </p:presentation>
 </file>
 
@@ -269,7 +264,7 @@
           <a:p>
             <a:fld id="{EED1C14C-A143-42F5-B247-D0E800131009}" type="datetimeFigureOut">
               <a:rPr lang="en-US" smtClean="0"/>
-              <a:t>3/27/2023</a:t>
+              <a:t>8/15/2018</a:t>
             </a:fld>
             <a:endParaRPr lang="en-US"/>
           </a:p>
@@ -467,7 +462,7 @@
           <a:p>
             <a:fld id="{EED1C14C-A143-42F5-B247-D0E800131009}" type="datetimeFigureOut">
               <a:rPr lang="en-US" smtClean="0"/>
-              <a:t>3/27/2023</a:t>
+              <a:t>8/15/2018</a:t>
             </a:fld>
             <a:endParaRPr lang="en-US"/>
           </a:p>
@@ -675,7 +670,7 @@
           <a:p>
             <a:fld id="{EED1C14C-A143-42F5-B247-D0E800131009}" type="datetimeFigureOut">
               <a:rPr lang="en-US" smtClean="0"/>
-              <a:t>3/27/2023</a:t>
+              <a:t>8/15/2018</a:t>
             </a:fld>
             <a:endParaRPr lang="en-US"/>
           </a:p>
@@ -873,7 +868,7 @@
           <a:p>
             <a:fld id="{EED1C14C-A143-42F5-B247-D0E800131009}" type="datetimeFigureOut">
               <a:rPr lang="en-US" smtClean="0"/>
-              <a:t>3/27/2023</a:t>
+              <a:t>8/15/2018</a:t>
             </a:fld>
             <a:endParaRPr lang="en-US"/>
           </a:p>
@@ -1148,7 +1143,7 @@
           <a:p>
             <a:fld id="{EED1C14C-A143-42F5-B247-D0E800131009}" type="datetimeFigureOut">
               <a:rPr lang="en-US" smtClean="0"/>
-              <a:t>3/27/2023</a:t>
+              <a:t>8/15/2018</a:t>
             </a:fld>
             <a:endParaRPr lang="en-US"/>
           </a:p>
@@ -1413,7 +1408,7 @@
           <a:p>
             <a:fld id="{EED1C14C-A143-42F5-B247-D0E800131009}" type="datetimeFigureOut">
               <a:rPr lang="en-US" smtClean="0"/>
-              <a:t>3/27/2023</a:t>
+              <a:t>8/15/2018</a:t>
             </a:fld>
             <a:endParaRPr lang="en-US"/>
           </a:p>
@@ -1825,7 +1820,7 @@
           <a:p>
             <a:fld id="{EED1C14C-A143-42F5-B247-D0E800131009}" type="datetimeFigureOut">
               <a:rPr lang="en-US" smtClean="0"/>
-              <a:t>3/27/2023</a:t>
+              <a:t>8/15/2018</a:t>
             </a:fld>
             <a:endParaRPr lang="en-US"/>
           </a:p>
@@ -1966,7 +1961,7 @@
           <a:p>
             <a:fld id="{EED1C14C-A143-42F5-B247-D0E800131009}" type="datetimeFigureOut">
               <a:rPr lang="en-US" smtClean="0"/>
-              <a:t>3/27/2023</a:t>
+              <a:t>8/15/2018</a:t>
             </a:fld>
             <a:endParaRPr lang="en-US"/>
           </a:p>
@@ -2079,7 +2074,7 @@
           <a:p>
             <a:fld id="{EED1C14C-A143-42F5-B247-D0E800131009}" type="datetimeFigureOut">
               <a:rPr lang="en-US" smtClean="0"/>
-              <a:t>3/27/2023</a:t>
+              <a:t>8/15/2018</a:t>
             </a:fld>
             <a:endParaRPr lang="en-US"/>
           </a:p>
@@ -2390,7 +2385,7 @@
           <a:p>
             <a:fld id="{EED1C14C-A143-42F5-B247-D0E800131009}" type="datetimeFigureOut">
               <a:rPr lang="en-US" smtClean="0"/>
-              <a:t>3/27/2023</a:t>
+              <a:t>8/15/2018</a:t>
             </a:fld>
             <a:endParaRPr lang="en-US"/>
           </a:p>
@@ -2678,7 +2673,7 @@
           <a:p>
             <a:fld id="{EED1C14C-A143-42F5-B247-D0E800131009}" type="datetimeFigureOut">
               <a:rPr lang="en-US" smtClean="0"/>
-              <a:t>3/27/2023</a:t>
+              <a:t>8/15/2018</a:t>
             </a:fld>
             <a:endParaRPr lang="en-US"/>
           </a:p>
@@ -2919,7 +2914,7 @@
           <a:p>
             <a:fld id="{EED1C14C-A143-42F5-B247-D0E800131009}" type="datetimeFigureOut">
               <a:rPr lang="en-US" smtClean="0"/>
-              <a:t>3/27/2023</a:t>
+              <a:t>8/15/2018</a:t>
             </a:fld>
             <a:endParaRPr lang="en-US"/>
           </a:p>
@@ -3320,19 +3315,8 @@
 </file>
 
 <file path=ppt/slides/slide1.xml><?xml version="1.0" encoding="utf-8"?>
-<p:sld xmlns:a="http://schemas.openxmlformats.org/drawingml/2006/main" xmlns:r="http://schemas.openxmlformats.org/officeDocument/2006/relationships" xmlns:p="http://schemas.openxmlformats.org/presentationml/2006/main">
+<p:sld xmlns:a="http://schemas.openxmlformats.org/drawingml/2006/main" xmlns:p="http://schemas.openxmlformats.org/presentationml/2006/main" xmlns:r="http://schemas.openxmlformats.org/officeDocument/2006/relationships">
   <p:cSld>
-    <p:bg>
-      <p:bgPr>
-        <a:solidFill>
-          <a:schemeClr val="accent4">
-            <a:lumMod val="60000"/>
-            <a:lumOff val="40000"/>
-          </a:schemeClr>
-        </a:solidFill>
-        <a:effectLst/>
-      </p:bgPr>
-    </p:bg>
     <p:spTree>
       <p:nvGrpSpPr>
         <p:cNvPr id="1" name=""/>
@@ -3349,88 +3333,48 @@
       </p:grpSpPr>
       <p:sp>
         <p:nvSpPr>
-          <p:cNvPr id="2" name="slide1">
-            <a:extLst>
-              <a:ext uri="{FF2B5EF4-FFF2-40B4-BE49-F238E27FC236}">
-                <a16:creationId xmlns:a16="http://schemas.microsoft.com/office/drawing/2014/main" id="{184264C8-E224-4D80-B7F0-E3B58A0138BC}"/>
-              </a:ext>
-            </a:extLst>
-          </p:cNvPr>
-          <p:cNvSpPr>
-            <a:spLocks noGrp="1"/>
-          </p:cNvSpPr>
-          <p:nvPr>
-            <p:ph type="ctrTitle"/>
+          <p:cNvPr id="0" name="slide1">
+            <a:extLst>
+              <a:ext uri="{FF2B5EF4-FFF2-40B4-BE49-F238E27FC236}">
+                <a16:creationId xmlns:a16="http://schemas.microsoft.com/office/drawing/2014/main" id="{12BE0841-DEF5-413C-94BB-8FF829D76228}"/>
+              </a:ext>
+            </a:extLst>
+          </p:cNvPr>
+          <p:cNvSpPr>
+            <a:spLocks noGrp="1"/>
+          </p:cNvSpPr>
+          <p:nvPr>
+            <p:ph idx="0" type="ctrTitle"/>
           </p:nvPr>
         </p:nvSpPr>
         <p:spPr/>
         <p:txBody>
-          <a:bodyPr>
-            <a:normAutofit fontScale="90000"/>
-          </a:bodyPr>
-          <a:lstStyle/>
-          <a:p>
-            <a:r>
-              <a:rPr lang="en-US" dirty="0">
-                <a:latin typeface="Amasis MT Pro Black" panose="020B0604020202020204" pitchFamily="18" charset="0"/>
-                <a:hlinkClick r:id="rId2"/>
+          <a:bodyPr/>
+          <a:lstStyle/>
+          <a:p>
+            <a:r>
+              <a:rPr dirty="0" lang="en-us">
+                <a:hlinkClick r:id="rId6"/>
               </a:rPr>
-              <a:t>E</a:t>
-            </a:r>
-            <a:r>
-              <a:rPr lang="en-us" dirty="0">
-                <a:latin typeface="Amasis MT Pro Black" panose="020B0604020202020204" pitchFamily="18" charset="0"/>
-                <a:hlinkClick r:id="rId2"/>
-              </a:rPr>
-              <a:t>thnicity </a:t>
-            </a:r>
-            <a:br>
-              <a:rPr lang="en-us" dirty="0">
-                <a:latin typeface="Amasis MT Pro Black" panose="020B0604020202020204" pitchFamily="18" charset="0"/>
-                <a:hlinkClick r:id="rId2"/>
-              </a:rPr>
-            </a:br>
-            <a:r>
-              <a:rPr lang="en-US" dirty="0">
-                <a:latin typeface="Amasis MT Pro Black" panose="020B0604020202020204" pitchFamily="18" charset="0"/>
-                <a:hlinkClick r:id="rId2"/>
-              </a:rPr>
-              <a:t>And </a:t>
-            </a:r>
-            <a:br>
-              <a:rPr lang="en-US" dirty="0">
-                <a:latin typeface="Amasis MT Pro Black" panose="020B0604020202020204" pitchFamily="18" charset="0"/>
-                <a:hlinkClick r:id="rId2"/>
-              </a:rPr>
-            </a:br>
-            <a:r>
-              <a:rPr lang="en-US" dirty="0">
-                <a:latin typeface="Amasis MT Pro Black" panose="020B0604020202020204" pitchFamily="18" charset="0"/>
-                <a:hlinkClick r:id="rId2"/>
-              </a:rPr>
-              <a:t>Spend</a:t>
-            </a:r>
-            <a:endParaRPr lang="en-us" dirty="0">
-              <a:latin typeface="Amasis MT Pro Black" panose="020B0604020202020204" pitchFamily="18" charset="0"/>
-              <a:hlinkClick r:id="rId2"/>
-            </a:endParaRPr>
-          </a:p>
-        </p:txBody>
-      </p:sp>
-      <p:sp>
-        <p:nvSpPr>
-          <p:cNvPr id="3" name="slide1">
-            <a:extLst>
-              <a:ext uri="{FF2B5EF4-FFF2-40B4-BE49-F238E27FC236}">
-                <a16:creationId xmlns:a16="http://schemas.microsoft.com/office/drawing/2014/main" id="{FDC64ADA-85F6-45EA-85B4-436D71F181A9}"/>
-              </a:ext>
-            </a:extLst>
-          </p:cNvPr>
-          <p:cNvSpPr>
-            <a:spLocks noGrp="1"/>
-          </p:cNvSpPr>
-          <p:nvPr>
-            <p:ph type="subTitle" idx="1"/>
+              <a:t>Ethnic group bubble</a:t>
+            </a:r>
+          </a:p>
+        </p:txBody>
+      </p:sp>
+      <p:sp>
+        <p:nvSpPr>
+          <p:cNvPr id="1" name="slide1">
+            <a:extLst>
+              <a:ext uri="{FF2B5EF4-FFF2-40B4-BE49-F238E27FC236}">
+                <a16:creationId xmlns:a16="http://schemas.microsoft.com/office/drawing/2014/main" id="{3A0099E7-CB57-4BB8-88B0-1D74CE357A99}"/>
+              </a:ext>
+            </a:extLst>
+          </p:cNvPr>
+          <p:cNvSpPr>
+            <a:spLocks noGrp="1"/>
+          </p:cNvSpPr>
+          <p:nvPr>
+            <p:ph idx="1" type="subTitle"/>
           </p:nvPr>
         </p:nvSpPr>
         <p:spPr/>
@@ -3439,8 +3383,8 @@
           <a:lstStyle/>
           <a:p>
             <a:r>
-              <a:rPr dirty="0"/>
-              <a:t>File created on: 3/27/2023 7:34:06 PM</a:t>
+              <a:rPr/>
+              <a:t>File created on: 3/28/2023 5:16:05 PM</a:t>
             </a:r>
           </a:p>
         </p:txBody>
@@ -3459,7 +3403,7 @@
 </file>
 
 <file path=ppt/slides/slide10.xml><?xml version="1.0" encoding="utf-8"?>
-<p:sld xmlns:a="http://schemas.openxmlformats.org/drawingml/2006/main" xmlns:r="http://schemas.openxmlformats.org/officeDocument/2006/relationships" xmlns:p="http://schemas.openxmlformats.org/presentationml/2006/main">
+<p:sld xmlns:a="http://schemas.openxmlformats.org/drawingml/2006/main" xmlns:p="http://schemas.openxmlformats.org/presentationml/2006/main" xmlns:r="http://schemas.openxmlformats.org/officeDocument/2006/relationships">
   <p:cSld>
     <p:spTree>
       <p:nvGrpSpPr>
@@ -3477,10 +3421,10 @@
       </p:grpSpPr>
       <p:pic>
         <p:nvPicPr>
-          <p:cNvPr id="10" name="slide10" descr="Box Plot Excluding Most W. Euro Outliers Limited to $15,000">
-            <a:extLst>
-              <a:ext uri="{FF2B5EF4-FFF2-40B4-BE49-F238E27FC236}">
-                <a16:creationId xmlns:a16="http://schemas.microsoft.com/office/drawing/2014/main" id="{67927504-4DC8-4A99-9957-A2E46BACD8BB}"/>
+          <p:cNvPr descr="Box Plot Excluding Most W. Euro Outliers Limited to $15,000" id="10" name="slide10">
+            <a:extLst>
+              <a:ext uri="{FF2B5EF4-FFF2-40B4-BE49-F238E27FC236}">
+                <a16:creationId xmlns:a16="http://schemas.microsoft.com/office/drawing/2014/main" id="{2A85F3CD-02AC-4C72-A816-30EB246B7E69}"/>
               </a:ext>
             </a:extLst>
           </p:cNvPr>
@@ -3490,7 +3434,7 @@
           <p:nvPr/>
         </p:nvPicPr>
         <p:blipFill>
-          <a:blip r:embed="rId2">
+          <a:blip r:embed="rId15">
             <a:extLst>
               <a:ext uri="{28A0092B-C50C-407E-A947-70E740481C1C}">
                 <a14:useLocalDpi xmlns:a14="http://schemas.microsoft.com/office/drawing/2010/main" val="0"/>
@@ -3503,7 +3447,7 @@
         </p:blipFill>
         <p:spPr>
           <a:xfrm>
-            <a:off x="0" y="1129401"/>
+            <a:off x="0" y="564700"/>
             <a:ext cx="12192000" cy="5728599"/>
           </a:xfrm>
           <a:prstGeom prst="rect">
@@ -3511,41 +3455,6 @@
           </a:prstGeom>
         </p:spPr>
       </p:pic>
-      <p:sp>
-        <p:nvSpPr>
-          <p:cNvPr id="2" name="TextBox 1">
-            <a:extLst>
-              <a:ext uri="{FF2B5EF4-FFF2-40B4-BE49-F238E27FC236}">
-                <a16:creationId xmlns:a16="http://schemas.microsoft.com/office/drawing/2014/main" id="{EEF0FC39-5CAA-A2B0-CF7A-0F23392870D3}"/>
-              </a:ext>
-            </a:extLst>
-          </p:cNvPr>
-          <p:cNvSpPr txBox="1"/>
-          <p:nvPr/>
-        </p:nvSpPr>
-        <p:spPr>
-          <a:xfrm>
-            <a:off x="537882" y="430306"/>
-            <a:ext cx="7207422" cy="369332"/>
-          </a:xfrm>
-          <a:prstGeom prst="rect">
-            <a:avLst/>
-          </a:prstGeom>
-          <a:noFill/>
-        </p:spPr>
-        <p:txBody>
-          <a:bodyPr wrap="none" rtlCol="0">
-            <a:spAutoFit/>
-          </a:bodyPr>
-          <a:lstStyle/>
-          <a:p>
-            <a:r>
-              <a:rPr lang="en-US" dirty="0"/>
-              <a:t>Box plot excluding most Western European outliers, and limited to $15,000.</a:t>
-            </a:r>
-          </a:p>
-        </p:txBody>
-      </p:sp>
     </p:spTree>
     <p:extLst>
       <p:ext uri="{BB962C8B-B14F-4D97-AF65-F5344CB8AC3E}">
@@ -3560,7 +3469,7 @@
 </file>
 
 <file path=ppt/slides/slide11.xml><?xml version="1.0" encoding="utf-8"?>
-<p:sld xmlns:a="http://schemas.openxmlformats.org/drawingml/2006/main" xmlns:r="http://schemas.openxmlformats.org/officeDocument/2006/relationships" xmlns:p="http://schemas.openxmlformats.org/presentationml/2006/main">
+<p:sld xmlns:a="http://schemas.openxmlformats.org/drawingml/2006/main" xmlns:p="http://schemas.openxmlformats.org/presentationml/2006/main" xmlns:r="http://schemas.openxmlformats.org/officeDocument/2006/relationships">
   <p:cSld>
     <p:spTree>
       <p:nvGrpSpPr>
@@ -3578,10 +3487,10 @@
       </p:grpSpPr>
       <p:pic>
         <p:nvPicPr>
-          <p:cNvPr id="11" name="slide11" descr="Top TEN contributors">
-            <a:extLst>
-              <a:ext uri="{FF2B5EF4-FFF2-40B4-BE49-F238E27FC236}">
-                <a16:creationId xmlns:a16="http://schemas.microsoft.com/office/drawing/2014/main" id="{9885B897-74DD-4380-AF96-BE02699B04F7}"/>
+          <p:cNvPr descr="Top TEN contributors" id="11" name="slide11">
+            <a:extLst>
+              <a:ext uri="{FF2B5EF4-FFF2-40B4-BE49-F238E27FC236}">
+                <a16:creationId xmlns:a16="http://schemas.microsoft.com/office/drawing/2014/main" id="{85F4B9EA-3C0D-487C-836B-54DC01DAE9D8}"/>
               </a:ext>
             </a:extLst>
           </p:cNvPr>
@@ -3591,7 +3500,7 @@
           <p:nvPr/>
         </p:nvPicPr>
         <p:blipFill>
-          <a:blip r:embed="rId2">
+          <a:blip r:embed="rId16">
             <a:extLst>
               <a:ext uri="{28A0092B-C50C-407E-A947-70E740481C1C}">
                 <a14:useLocalDpi xmlns:a14="http://schemas.microsoft.com/office/drawing/2010/main" val="0"/>
@@ -3612,41 +3521,6 @@
           </a:prstGeom>
         </p:spPr>
       </p:pic>
-      <p:sp>
-        <p:nvSpPr>
-          <p:cNvPr id="2" name="TextBox 1">
-            <a:extLst>
-              <a:ext uri="{FF2B5EF4-FFF2-40B4-BE49-F238E27FC236}">
-                <a16:creationId xmlns:a16="http://schemas.microsoft.com/office/drawing/2014/main" id="{7CE9265C-D28A-8023-91C8-6DF1444251E1}"/>
-              </a:ext>
-            </a:extLst>
-          </p:cNvPr>
-          <p:cNvSpPr txBox="1"/>
-          <p:nvPr/>
-        </p:nvSpPr>
-        <p:spPr>
-          <a:xfrm>
-            <a:off x="735106" y="744071"/>
-            <a:ext cx="9774407" cy="369332"/>
-          </a:xfrm>
-          <a:prstGeom prst="rect">
-            <a:avLst/>
-          </a:prstGeom>
-          <a:noFill/>
-        </p:spPr>
-        <p:txBody>
-          <a:bodyPr wrap="none" rtlCol="0">
-            <a:spAutoFit/>
-          </a:bodyPr>
-          <a:lstStyle/>
-          <a:p>
-            <a:r>
-              <a:rPr lang="en-US" dirty="0"/>
-              <a:t>Important chart showing our top ten “contributors” or spenders in one group.  Store region is included.</a:t>
-            </a:r>
-          </a:p>
-        </p:txBody>
-      </p:sp>
     </p:spTree>
     <p:extLst>
       <p:ext uri="{BB962C8B-B14F-4D97-AF65-F5344CB8AC3E}">
@@ -3661,7 +3535,7 @@
 </file>
 
 <file path=ppt/slides/slide2.xml><?xml version="1.0" encoding="utf-8"?>
-<p:sld xmlns:a="http://schemas.openxmlformats.org/drawingml/2006/main" xmlns:r="http://schemas.openxmlformats.org/officeDocument/2006/relationships" xmlns:p="http://schemas.openxmlformats.org/presentationml/2006/main">
+<p:sld xmlns:a="http://schemas.openxmlformats.org/drawingml/2006/main" xmlns:p="http://schemas.openxmlformats.org/presentationml/2006/main" xmlns:r="http://schemas.openxmlformats.org/officeDocument/2006/relationships">
   <p:cSld>
     <p:spTree>
       <p:nvGrpSpPr>
@@ -3679,10 +3553,10 @@
       </p:grpSpPr>
       <p:pic>
         <p:nvPicPr>
-          <p:cNvPr id="2" name="slide2" descr="Liftetime Demand Non West">
-            <a:extLst>
-              <a:ext uri="{FF2B5EF4-FFF2-40B4-BE49-F238E27FC236}">
-                <a16:creationId xmlns:a16="http://schemas.microsoft.com/office/drawing/2014/main" id="{40F99C1F-3C7F-4EA5-ADE9-3F42DC25ADAD}"/>
+          <p:cNvPr descr="Liftetime Demand Non West" id="2" name="slide2">
+            <a:extLst>
+              <a:ext uri="{FF2B5EF4-FFF2-40B4-BE49-F238E27FC236}">
+                <a16:creationId xmlns:a16="http://schemas.microsoft.com/office/drawing/2014/main" id="{9E0BC1B2-CD46-45CD-91B9-58574690FA66}"/>
               </a:ext>
             </a:extLst>
           </p:cNvPr>
@@ -3692,7 +3566,7 @@
           <p:nvPr/>
         </p:nvPicPr>
         <p:blipFill>
-          <a:blip r:embed="rId2">
+          <a:blip r:embed="rId7">
             <a:extLst>
               <a:ext uri="{28A0092B-C50C-407E-A947-70E740481C1C}">
                 <a14:useLocalDpi xmlns:a14="http://schemas.microsoft.com/office/drawing/2010/main" val="0"/>
@@ -3705,61 +3579,14 @@
         </p:blipFill>
         <p:spPr>
           <a:xfrm>
-            <a:off x="3589131" y="0"/>
-            <a:ext cx="8381051" cy="6517341"/>
+            <a:off x="1449982" y="0"/>
+            <a:ext cx="9292035" cy="6858000"/>
           </a:xfrm>
           <a:prstGeom prst="rect">
             <a:avLst/>
           </a:prstGeom>
         </p:spPr>
       </p:pic>
-      <p:sp>
-        <p:nvSpPr>
-          <p:cNvPr id="3" name="TextBox 2">
-            <a:extLst>
-              <a:ext uri="{FF2B5EF4-FFF2-40B4-BE49-F238E27FC236}">
-                <a16:creationId xmlns:a16="http://schemas.microsoft.com/office/drawing/2014/main" id="{C1FC0EEE-AB18-F202-C152-5D747C809C9F}"/>
-              </a:ext>
-            </a:extLst>
-          </p:cNvPr>
-          <p:cNvSpPr txBox="1"/>
-          <p:nvPr/>
-        </p:nvSpPr>
-        <p:spPr>
-          <a:xfrm>
-            <a:off x="591671" y="636494"/>
-            <a:ext cx="2973571" cy="923330"/>
-          </a:xfrm>
-          <a:prstGeom prst="rect">
-            <a:avLst/>
-          </a:prstGeom>
-          <a:noFill/>
-        </p:spPr>
-        <p:txBody>
-          <a:bodyPr wrap="none" rtlCol="0">
-            <a:spAutoFit/>
-          </a:bodyPr>
-          <a:lstStyle/>
-          <a:p>
-            <a:r>
-              <a:rPr lang="en-US" dirty="0"/>
-              <a:t>Removing the Western</a:t>
-            </a:r>
-          </a:p>
-          <a:p>
-            <a:r>
-              <a:rPr lang="en-US" dirty="0"/>
-              <a:t>European column, this chart</a:t>
-            </a:r>
-          </a:p>
-          <a:p>
-            <a:r>
-              <a:rPr lang="en-US" dirty="0"/>
-              <a:t>Shows the rest of the regions.</a:t>
-            </a:r>
-          </a:p>
-        </p:txBody>
-      </p:sp>
     </p:spTree>
     <p:extLst>
       <p:ext uri="{BB962C8B-B14F-4D97-AF65-F5344CB8AC3E}">
@@ -3774,7 +3601,7 @@
 </file>
 
 <file path=ppt/slides/slide3.xml><?xml version="1.0" encoding="utf-8"?>
-<p:sld xmlns:a="http://schemas.openxmlformats.org/drawingml/2006/main" xmlns:r="http://schemas.openxmlformats.org/officeDocument/2006/relationships" xmlns:p="http://schemas.openxmlformats.org/presentationml/2006/main">
+<p:sld xmlns:a="http://schemas.openxmlformats.org/drawingml/2006/main" xmlns:p="http://schemas.openxmlformats.org/presentationml/2006/main" xmlns:r="http://schemas.openxmlformats.org/officeDocument/2006/relationships">
   <p:cSld>
     <p:spTree>
       <p:nvGrpSpPr>
@@ -3792,10 +3619,10 @@
       </p:grpSpPr>
       <p:pic>
         <p:nvPicPr>
-          <p:cNvPr id="3" name="slide3" descr="Liftetime Demand Western Euro">
-            <a:extLst>
-              <a:ext uri="{FF2B5EF4-FFF2-40B4-BE49-F238E27FC236}">
-                <a16:creationId xmlns:a16="http://schemas.microsoft.com/office/drawing/2014/main" id="{9CB51C8A-C79F-4CD2-85F8-4012A48CBC52}"/>
+          <p:cNvPr descr="Liftetime Demand Western Euro" id="3" name="slide3">
+            <a:extLst>
+              <a:ext uri="{FF2B5EF4-FFF2-40B4-BE49-F238E27FC236}">
+                <a16:creationId xmlns:a16="http://schemas.microsoft.com/office/drawing/2014/main" id="{C987D524-BF0D-48EC-8EE8-CCA9A05553ED}"/>
               </a:ext>
             </a:extLst>
           </p:cNvPr>
@@ -3805,7 +3632,7 @@
           <p:nvPr/>
         </p:nvPicPr>
         <p:blipFill>
-          <a:blip r:embed="rId2">
+          <a:blip r:embed="rId8">
             <a:extLst>
               <a:ext uri="{28A0092B-C50C-407E-A947-70E740481C1C}">
                 <a14:useLocalDpi xmlns:a14="http://schemas.microsoft.com/office/drawing/2010/main" val="0"/>
@@ -3826,57 +3653,6 @@
           </a:prstGeom>
         </p:spPr>
       </p:pic>
-      <p:sp>
-        <p:nvSpPr>
-          <p:cNvPr id="2" name="TextBox 1">
-            <a:extLst>
-              <a:ext uri="{FF2B5EF4-FFF2-40B4-BE49-F238E27FC236}">
-                <a16:creationId xmlns:a16="http://schemas.microsoft.com/office/drawing/2014/main" id="{22D5F111-6C2C-0D33-C9FB-FEC56989B36B}"/>
-              </a:ext>
-            </a:extLst>
-          </p:cNvPr>
-          <p:cNvSpPr txBox="1"/>
-          <p:nvPr/>
-        </p:nvSpPr>
-        <p:spPr>
-          <a:xfrm>
-            <a:off x="313765" y="663388"/>
-            <a:ext cx="3129318" cy="923330"/>
-          </a:xfrm>
-          <a:prstGeom prst="rect">
-            <a:avLst/>
-          </a:prstGeom>
-          <a:noFill/>
-        </p:spPr>
-        <p:txBody>
-          <a:bodyPr wrap="none" rtlCol="0">
-            <a:spAutoFit/>
-          </a:bodyPr>
-          <a:lstStyle/>
-          <a:p>
-            <a:r>
-              <a:rPr lang="en-US" dirty="0"/>
-              <a:t>This chart shows ONLY Western</a:t>
-            </a:r>
-          </a:p>
-          <a:p>
-            <a:r>
-              <a:rPr lang="en-US" dirty="0"/>
-              <a:t>Europeans.  This region is over-</a:t>
-            </a:r>
-          </a:p>
-          <a:p>
-            <a:r>
-              <a:rPr lang="en-US" dirty="0" err="1"/>
-              <a:t>whemingly</a:t>
-            </a:r>
-            <a:r>
-              <a:rPr lang="en-US" dirty="0"/>
-              <a:t> high comparatively.</a:t>
-            </a:r>
-          </a:p>
-        </p:txBody>
-      </p:sp>
     </p:spTree>
     <p:extLst>
       <p:ext uri="{BB962C8B-B14F-4D97-AF65-F5344CB8AC3E}">
@@ -3891,7 +3667,7 @@
 </file>
 
 <file path=ppt/slides/slide4.xml><?xml version="1.0" encoding="utf-8"?>
-<p:sld xmlns:a="http://schemas.openxmlformats.org/drawingml/2006/main" xmlns:r="http://schemas.openxmlformats.org/officeDocument/2006/relationships" xmlns:p="http://schemas.openxmlformats.org/presentationml/2006/main">
+<p:sld xmlns:a="http://schemas.openxmlformats.org/drawingml/2006/main" xmlns:p="http://schemas.openxmlformats.org/presentationml/2006/main" xmlns:r="http://schemas.openxmlformats.org/officeDocument/2006/relationships">
   <p:cSld>
     <p:spTree>
       <p:nvGrpSpPr>
@@ -3909,10 +3685,10 @@
       </p:grpSpPr>
       <p:pic>
         <p:nvPicPr>
-          <p:cNvPr id="4" name="slide4" descr="Working with K Group">
-            <a:extLst>
-              <a:ext uri="{FF2B5EF4-FFF2-40B4-BE49-F238E27FC236}">
-                <a16:creationId xmlns:a16="http://schemas.microsoft.com/office/drawing/2014/main" id="{F8380718-E85B-4E20-B334-1A0D8C84B116}"/>
+          <p:cNvPr descr="Working with K Group" id="4" name="slide4">
+            <a:extLst>
+              <a:ext uri="{FF2B5EF4-FFF2-40B4-BE49-F238E27FC236}">
+                <a16:creationId xmlns:a16="http://schemas.microsoft.com/office/drawing/2014/main" id="{261264C8-4B74-4387-9156-4C95612D28DC}"/>
               </a:ext>
             </a:extLst>
           </p:cNvPr>
@@ -3922,7 +3698,7 @@
           <p:nvPr/>
         </p:nvPicPr>
         <p:blipFill>
-          <a:blip r:embed="rId2">
+          <a:blip r:embed="rId9">
             <a:extLst>
               <a:ext uri="{28A0092B-C50C-407E-A947-70E740481C1C}">
                 <a14:useLocalDpi xmlns:a14="http://schemas.microsoft.com/office/drawing/2010/main" val="0"/>
@@ -3957,7 +3733,7 @@
 </file>
 
 <file path=ppt/slides/slide5.xml><?xml version="1.0" encoding="utf-8"?>
-<p:sld xmlns:a="http://schemas.openxmlformats.org/drawingml/2006/main" xmlns:r="http://schemas.openxmlformats.org/officeDocument/2006/relationships" xmlns:p="http://schemas.openxmlformats.org/presentationml/2006/main">
+<p:sld xmlns:a="http://schemas.openxmlformats.org/drawingml/2006/main" xmlns:p="http://schemas.openxmlformats.org/presentationml/2006/main" xmlns:r="http://schemas.openxmlformats.org/officeDocument/2006/relationships">
   <p:cSld>
     <p:spTree>
       <p:nvGrpSpPr>
@@ -3975,10 +3751,10 @@
       </p:grpSpPr>
       <p:pic>
         <p:nvPicPr>
-          <p:cNvPr id="5" name="slide5" descr="Lifetime Demand by Count">
-            <a:extLst>
-              <a:ext uri="{FF2B5EF4-FFF2-40B4-BE49-F238E27FC236}">
-                <a16:creationId xmlns:a16="http://schemas.microsoft.com/office/drawing/2014/main" id="{9B4F7848-A5A5-4A0C-9C70-B19DF0896B6D}"/>
+          <p:cNvPr descr="Lifetime Demand by Count" id="5" name="slide5">
+            <a:extLst>
+              <a:ext uri="{FF2B5EF4-FFF2-40B4-BE49-F238E27FC236}">
+                <a16:creationId xmlns:a16="http://schemas.microsoft.com/office/drawing/2014/main" id="{B99F8307-669B-4ADB-BAF0-274F5963F4EA}"/>
               </a:ext>
             </a:extLst>
           </p:cNvPr>
@@ -3988,7 +3764,7 @@
           <p:nvPr/>
         </p:nvPicPr>
         <p:blipFill>
-          <a:blip r:embed="rId2">
+          <a:blip r:embed="rId10">
             <a:extLst>
               <a:ext uri="{28A0092B-C50C-407E-A947-70E740481C1C}">
                 <a14:useLocalDpi xmlns:a14="http://schemas.microsoft.com/office/drawing/2010/main" val="0"/>
@@ -4001,7 +3777,7 @@
         </p:blipFill>
         <p:spPr>
           <a:xfrm>
-            <a:off x="3785299" y="71717"/>
+            <a:off x="2171652" y="0"/>
             <a:ext cx="7848695" cy="6858000"/>
           </a:xfrm>
           <a:prstGeom prst="rect">
@@ -4023,7 +3799,7 @@
 </file>
 
 <file path=ppt/slides/slide6.xml><?xml version="1.0" encoding="utf-8"?>
-<p:sld xmlns:a="http://schemas.openxmlformats.org/drawingml/2006/main" xmlns:r="http://schemas.openxmlformats.org/officeDocument/2006/relationships" xmlns:p="http://schemas.openxmlformats.org/presentationml/2006/main">
+<p:sld xmlns:a="http://schemas.openxmlformats.org/drawingml/2006/main" xmlns:p="http://schemas.openxmlformats.org/presentationml/2006/main" xmlns:r="http://schemas.openxmlformats.org/officeDocument/2006/relationships">
   <p:cSld>
     <p:spTree>
       <p:nvGrpSpPr>
@@ -4041,10 +3817,10 @@
       </p:grpSpPr>
       <p:pic>
         <p:nvPicPr>
-          <p:cNvPr id="6" name="slide6" descr="Average Lifetime Demand">
-            <a:extLst>
-              <a:ext uri="{FF2B5EF4-FFF2-40B4-BE49-F238E27FC236}">
-                <a16:creationId xmlns:a16="http://schemas.microsoft.com/office/drawing/2014/main" id="{CCCA11C2-885A-4AEB-8202-B6608E89E0DE}"/>
+          <p:cNvPr descr="Average Lifetime Demand" id="6" name="slide6">
+            <a:extLst>
+              <a:ext uri="{FF2B5EF4-FFF2-40B4-BE49-F238E27FC236}">
+                <a16:creationId xmlns:a16="http://schemas.microsoft.com/office/drawing/2014/main" id="{0C8E2E6C-2672-4AE8-A216-A5B554631849}"/>
               </a:ext>
             </a:extLst>
           </p:cNvPr>
@@ -4054,7 +3830,7 @@
           <p:nvPr/>
         </p:nvPicPr>
         <p:blipFill>
-          <a:blip r:embed="rId2">
+          <a:blip r:embed="rId11">
             <a:extLst>
               <a:ext uri="{28A0092B-C50C-407E-A947-70E740481C1C}">
                 <a14:useLocalDpi xmlns:a14="http://schemas.microsoft.com/office/drawing/2010/main" val="0"/>
@@ -4067,7 +3843,7 @@
         </p:blipFill>
         <p:spPr>
           <a:xfrm>
-            <a:off x="3444640" y="0"/>
+            <a:off x="2171652" y="0"/>
             <a:ext cx="7848695" cy="6858000"/>
           </a:xfrm>
           <a:prstGeom prst="rect">
@@ -4075,53 +3851,6 @@
           </a:prstGeom>
         </p:spPr>
       </p:pic>
-      <p:sp>
-        <p:nvSpPr>
-          <p:cNvPr id="2" name="TextBox 1">
-            <a:extLst>
-              <a:ext uri="{FF2B5EF4-FFF2-40B4-BE49-F238E27FC236}">
-                <a16:creationId xmlns:a16="http://schemas.microsoft.com/office/drawing/2014/main" id="{36430CBE-71FC-F676-BD87-EAAB67391019}"/>
-              </a:ext>
-            </a:extLst>
-          </p:cNvPr>
-          <p:cNvSpPr txBox="1"/>
-          <p:nvPr/>
-        </p:nvSpPr>
-        <p:spPr>
-          <a:xfrm>
-            <a:off x="457200" y="717176"/>
-            <a:ext cx="2924455" cy="923330"/>
-          </a:xfrm>
-          <a:prstGeom prst="rect">
-            <a:avLst/>
-          </a:prstGeom>
-          <a:noFill/>
-        </p:spPr>
-        <p:txBody>
-          <a:bodyPr wrap="none" rtlCol="0">
-            <a:spAutoFit/>
-          </a:bodyPr>
-          <a:lstStyle/>
-          <a:p>
-            <a:r>
-              <a:rPr lang="en-US" dirty="0"/>
-              <a:t>When we average count out</a:t>
-            </a:r>
-          </a:p>
-          <a:p>
-            <a:r>
-              <a:rPr lang="en-US" dirty="0"/>
-              <a:t>we get a more balanced view</a:t>
-            </a:r>
-          </a:p>
-          <a:p>
-            <a:r>
-              <a:rPr lang="en-US" dirty="0"/>
-              <a:t>of lifetime demand.</a:t>
-            </a:r>
-          </a:p>
-        </p:txBody>
-      </p:sp>
     </p:spTree>
     <p:extLst>
       <p:ext uri="{BB962C8B-B14F-4D97-AF65-F5344CB8AC3E}">
@@ -4136,7 +3865,7 @@
 </file>
 
 <file path=ppt/slides/slide7.xml><?xml version="1.0" encoding="utf-8"?>
-<p:sld xmlns:a="http://schemas.openxmlformats.org/drawingml/2006/main" xmlns:r="http://schemas.openxmlformats.org/officeDocument/2006/relationships" xmlns:p="http://schemas.openxmlformats.org/presentationml/2006/main">
+<p:sld xmlns:a="http://schemas.openxmlformats.org/drawingml/2006/main" xmlns:p="http://schemas.openxmlformats.org/presentationml/2006/main" xmlns:r="http://schemas.openxmlformats.org/officeDocument/2006/relationships">
   <p:cSld>
     <p:spTree>
       <p:nvGrpSpPr>
@@ -4154,10 +3883,10 @@
       </p:grpSpPr>
       <p:pic>
         <p:nvPicPr>
-          <p:cNvPr id="7" name="slide7" descr="CLV Table">
-            <a:extLst>
-              <a:ext uri="{FF2B5EF4-FFF2-40B4-BE49-F238E27FC236}">
-                <a16:creationId xmlns:a16="http://schemas.microsoft.com/office/drawing/2014/main" id="{C00EDA31-9E2A-402C-8DD8-99246057E7F2}"/>
+          <p:cNvPr descr="CLV Table" id="7" name="slide7">
+            <a:extLst>
+              <a:ext uri="{FF2B5EF4-FFF2-40B4-BE49-F238E27FC236}">
+                <a16:creationId xmlns:a16="http://schemas.microsoft.com/office/drawing/2014/main" id="{16B33FF0-CC32-418D-8FB5-06EEC46C4CD1}"/>
               </a:ext>
             </a:extLst>
           </p:cNvPr>
@@ -4167,7 +3896,7 @@
           <p:nvPr/>
         </p:nvPicPr>
         <p:blipFill>
-          <a:blip r:embed="rId2">
+          <a:blip r:embed="rId12">
             <a:extLst>
               <a:ext uri="{28A0092B-C50C-407E-A947-70E740481C1C}">
                 <a14:useLocalDpi xmlns:a14="http://schemas.microsoft.com/office/drawing/2010/main" val="0"/>
@@ -4188,81 +3917,6 @@
           </a:prstGeom>
         </p:spPr>
       </p:pic>
-      <p:sp>
-        <p:nvSpPr>
-          <p:cNvPr id="2" name="TextBox 1">
-            <a:extLst>
-              <a:ext uri="{FF2B5EF4-FFF2-40B4-BE49-F238E27FC236}">
-                <a16:creationId xmlns:a16="http://schemas.microsoft.com/office/drawing/2014/main" id="{35CC85E7-2ED0-AC9E-4E1B-62D8DAC32B00}"/>
-              </a:ext>
-            </a:extLst>
-          </p:cNvPr>
-          <p:cNvSpPr txBox="1"/>
-          <p:nvPr/>
-        </p:nvSpPr>
-        <p:spPr>
-          <a:xfrm>
-            <a:off x="690282" y="1201271"/>
-            <a:ext cx="3471848" cy="2031325"/>
-          </a:xfrm>
-          <a:prstGeom prst="rect">
-            <a:avLst/>
-          </a:prstGeom>
-          <a:noFill/>
-        </p:spPr>
-        <p:txBody>
-          <a:bodyPr wrap="none" rtlCol="0">
-            <a:spAutoFit/>
-          </a:bodyPr>
-          <a:lstStyle/>
-          <a:p>
-            <a:r>
-              <a:rPr lang="en-US" dirty="0"/>
-              <a:t>Chart shows the totals of the so-</a:t>
-            </a:r>
-          </a:p>
-          <a:p>
-            <a:r>
-              <a:rPr lang="en-US" dirty="0"/>
-              <a:t>Called “Champion” spenders.  </a:t>
-            </a:r>
-          </a:p>
-          <a:p>
-            <a:r>
-              <a:rPr lang="en-US" dirty="0"/>
-              <a:t>The company could focus more on</a:t>
-            </a:r>
-          </a:p>
-          <a:p>
-            <a:r>
-              <a:rPr lang="en-US" dirty="0"/>
-              <a:t>The Hibernators and the Need </a:t>
-            </a:r>
-          </a:p>
-          <a:p>
-            <a:r>
-              <a:rPr lang="en-US" dirty="0"/>
-              <a:t>Attention groups going forward.</a:t>
-            </a:r>
-          </a:p>
-          <a:p>
-            <a:r>
-              <a:rPr lang="en-US" dirty="0"/>
-              <a:t>“CLV” stands for </a:t>
-            </a:r>
-            <a:r>
-              <a:rPr lang="en-US" i="1" dirty="0"/>
-              <a:t>Customer Lifetime</a:t>
-            </a:r>
-          </a:p>
-          <a:p>
-            <a:r>
-              <a:rPr lang="en-US" i="1" dirty="0"/>
-              <a:t>Value.</a:t>
-            </a:r>
-          </a:p>
-        </p:txBody>
-      </p:sp>
     </p:spTree>
     <p:extLst>
       <p:ext uri="{BB962C8B-B14F-4D97-AF65-F5344CB8AC3E}">
@@ -4277,7 +3931,7 @@
 </file>
 
 <file path=ppt/slides/slide8.xml><?xml version="1.0" encoding="utf-8"?>
-<p:sld xmlns:a="http://schemas.openxmlformats.org/drawingml/2006/main" xmlns:r="http://schemas.openxmlformats.org/officeDocument/2006/relationships" xmlns:p="http://schemas.openxmlformats.org/presentationml/2006/main">
+<p:sld xmlns:a="http://schemas.openxmlformats.org/drawingml/2006/main" xmlns:p="http://schemas.openxmlformats.org/presentationml/2006/main" xmlns:r="http://schemas.openxmlformats.org/officeDocument/2006/relationships">
   <p:cSld>
     <p:spTree>
       <p:nvGrpSpPr>
@@ -4295,10 +3949,10 @@
       </p:grpSpPr>
       <p:pic>
         <p:nvPicPr>
-          <p:cNvPr id="8" name="slide8" descr="Ave. Vist">
-            <a:extLst>
-              <a:ext uri="{FF2B5EF4-FFF2-40B4-BE49-F238E27FC236}">
-                <a16:creationId xmlns:a16="http://schemas.microsoft.com/office/drawing/2014/main" id="{DED95233-C7C1-47F2-957A-39BDD229C759}"/>
+          <p:cNvPr descr="Ave. Vist" id="8" name="slide8">
+            <a:extLst>
+              <a:ext uri="{FF2B5EF4-FFF2-40B4-BE49-F238E27FC236}">
+                <a16:creationId xmlns:a16="http://schemas.microsoft.com/office/drawing/2014/main" id="{C88D5888-69B4-4634-9BF3-F63277CABB55}"/>
               </a:ext>
             </a:extLst>
           </p:cNvPr>
@@ -4308,7 +3962,7 @@
           <p:nvPr/>
         </p:nvPicPr>
         <p:blipFill>
-          <a:blip r:embed="rId2">
+          <a:blip r:embed="rId13">
             <a:extLst>
               <a:ext uri="{28A0092B-C50C-407E-A947-70E740481C1C}">
                 <a14:useLocalDpi xmlns:a14="http://schemas.microsoft.com/office/drawing/2010/main" val="0"/>
@@ -4321,7 +3975,7 @@
         </p:blipFill>
         <p:spPr>
           <a:xfrm>
-            <a:off x="0" y="1655994"/>
+            <a:off x="0" y="827997"/>
             <a:ext cx="12192000" cy="5202006"/>
           </a:xfrm>
           <a:prstGeom prst="rect">
@@ -4329,62 +3983,6 @@
           </a:prstGeom>
         </p:spPr>
       </p:pic>
-      <p:sp>
-        <p:nvSpPr>
-          <p:cNvPr id="2" name="TextBox 1">
-            <a:extLst>
-              <a:ext uri="{FF2B5EF4-FFF2-40B4-BE49-F238E27FC236}">
-                <a16:creationId xmlns:a16="http://schemas.microsoft.com/office/drawing/2014/main" id="{BC35F739-AAA9-C10F-2246-3D3A30FDB95C}"/>
-              </a:ext>
-            </a:extLst>
-          </p:cNvPr>
-          <p:cNvSpPr txBox="1"/>
-          <p:nvPr/>
-        </p:nvSpPr>
-        <p:spPr>
-          <a:xfrm>
-            <a:off x="331694" y="654424"/>
-            <a:ext cx="9571338" cy="923330"/>
-          </a:xfrm>
-          <a:prstGeom prst="rect">
-            <a:avLst/>
-          </a:prstGeom>
-          <a:noFill/>
-        </p:spPr>
-        <p:txBody>
-          <a:bodyPr wrap="none" rtlCol="0">
-            <a:spAutoFit/>
-          </a:bodyPr>
-          <a:lstStyle/>
-          <a:p>
-            <a:r>
-              <a:rPr lang="en-US" dirty="0"/>
-              <a:t>This grouping and bar chart intends to show the distribution of the separate groups who are in the </a:t>
-            </a:r>
-          </a:p>
-          <a:p>
-            <a:r>
-              <a:rPr lang="en-US" dirty="0"/>
-              <a:t>BG/NBD (Beta Geometric/Negative Binomial Distribution Model for Predicting Number of Purchase. </a:t>
-            </a:r>
-          </a:p>
-          <a:p>
-            <a:r>
-              <a:rPr lang="en-US" dirty="0"/>
-              <a:t>This model is a popular model in the </a:t>
-            </a:r>
-            <a:r>
-              <a:rPr lang="en-US" i="1" dirty="0"/>
-              <a:t>retail industry</a:t>
-            </a:r>
-            <a:r>
-              <a:rPr lang="en-US" dirty="0"/>
-              <a:t> today.</a:t>
-            </a:r>
-            <a:endParaRPr lang="en-US" i="1" dirty="0"/>
-          </a:p>
-        </p:txBody>
-      </p:sp>
     </p:spTree>
     <p:extLst>
       <p:ext uri="{BB962C8B-B14F-4D97-AF65-F5344CB8AC3E}">
@@ -4399,7 +3997,7 @@
 </file>
 
 <file path=ppt/slides/slide9.xml><?xml version="1.0" encoding="utf-8"?>
-<p:sld xmlns:a="http://schemas.openxmlformats.org/drawingml/2006/main" xmlns:r="http://schemas.openxmlformats.org/officeDocument/2006/relationships" xmlns:p="http://schemas.openxmlformats.org/presentationml/2006/main">
+<p:sld xmlns:a="http://schemas.openxmlformats.org/drawingml/2006/main" xmlns:p="http://schemas.openxmlformats.org/presentationml/2006/main" xmlns:r="http://schemas.openxmlformats.org/officeDocument/2006/relationships">
   <p:cSld>
     <p:spTree>
       <p:nvGrpSpPr>
@@ -4417,10 +4015,10 @@
       </p:grpSpPr>
       <p:pic>
         <p:nvPicPr>
-          <p:cNvPr id="9" name="slide9" descr="Top contributors (Western Europeans)">
-            <a:extLst>
-              <a:ext uri="{FF2B5EF4-FFF2-40B4-BE49-F238E27FC236}">
-                <a16:creationId xmlns:a16="http://schemas.microsoft.com/office/drawing/2014/main" id="{C90776FE-577B-46D2-AA6B-1800861DDC30}"/>
+          <p:cNvPr descr="Top contributors (Western Europeans)" id="9" name="slide9">
+            <a:extLst>
+              <a:ext uri="{FF2B5EF4-FFF2-40B4-BE49-F238E27FC236}">
+                <a16:creationId xmlns:a16="http://schemas.microsoft.com/office/drawing/2014/main" id="{D7E16D46-A643-4D12-93EA-52BF347AFD91}"/>
               </a:ext>
             </a:extLst>
           </p:cNvPr>
@@ -4430,7 +4028,7 @@
           <p:nvPr/>
         </p:nvPicPr>
         <p:blipFill>
-          <a:blip r:embed="rId2">
+          <a:blip r:embed="rId14">
             <a:extLst>
               <a:ext uri="{28A0092B-C50C-407E-A947-70E740481C1C}">
                 <a14:useLocalDpi xmlns:a14="http://schemas.microsoft.com/office/drawing/2010/main" val="0"/>
@@ -4443,7 +4041,7 @@
         </p:blipFill>
         <p:spPr>
           <a:xfrm>
-            <a:off x="62753" y="1591634"/>
+            <a:off x="0" y="795816"/>
             <a:ext cx="12192000" cy="5266366"/>
           </a:xfrm>
           <a:prstGeom prst="rect">
@@ -4451,41 +4049,36 @@
           </a:prstGeom>
         </p:spPr>
       </p:pic>
-      <p:sp>
-        <p:nvSpPr>
-          <p:cNvPr id="2" name="TextBox 1">
-            <a:extLst>
-              <a:ext uri="{FF2B5EF4-FFF2-40B4-BE49-F238E27FC236}">
-                <a16:creationId xmlns:a16="http://schemas.microsoft.com/office/drawing/2014/main" id="{2B19A458-990E-566A-0621-060936D8DD44}"/>
-              </a:ext>
-            </a:extLst>
-          </p:cNvPr>
-          <p:cNvSpPr txBox="1"/>
-          <p:nvPr/>
-        </p:nvSpPr>
-        <p:spPr>
-          <a:xfrm>
-            <a:off x="573741" y="403412"/>
-            <a:ext cx="9073766" cy="369332"/>
-          </a:xfrm>
-          <a:prstGeom prst="rect">
-            <a:avLst/>
-          </a:prstGeom>
-          <a:noFill/>
-        </p:spPr>
-        <p:txBody>
-          <a:bodyPr wrap="none" rtlCol="0">
-            <a:spAutoFit/>
-          </a:bodyPr>
-          <a:lstStyle/>
-          <a:p>
-            <a:r>
-              <a:rPr lang="en-US" dirty="0"/>
-              <a:t>The top ten spenders or “Champions” are in red here, showing the distribution by store region.</a:t>
-            </a:r>
-          </a:p>
-        </p:txBody>
-      </p:sp>
+    </p:spTree>
+    <p:extLst>
+      <p:ext uri="{BB962C8B-B14F-4D97-AF65-F5344CB8AC3E}">
+        <p14:creationId xmlns:p14="http://schemas.microsoft.com/office/powerpoint/2010/main" val="95992585"/>
+      </p:ext>
+    </p:extLst>
+  </p:cSld>
+  <p:clrMapOvr>
+    <a:masterClrMapping/>
+  </p:clrMapOvr>
+</p:sld>
+</file>
+
+<file path=ppt/slides/slideTemplate.xml><?xml version="1.0" encoding="utf-8"?>
+<p:sld xmlns:a="http://schemas.openxmlformats.org/drawingml/2006/main" xmlns:r="http://schemas.openxmlformats.org/officeDocument/2006/relationships" xmlns:p="http://schemas.openxmlformats.org/presentationml/2006/main">
+  <p:cSld>
+    <p:spTree>
+      <p:nvGrpSpPr>
+        <p:cNvPr id="1" name=""/>
+        <p:cNvGrpSpPr/>
+        <p:nvPr/>
+      </p:nvGrpSpPr>
+      <p:grpSpPr>
+        <a:xfrm>
+          <a:off x="0" y="0"/>
+          <a:ext cx="0" cy="0"/>
+          <a:chOff x="0" y="0"/>
+          <a:chExt cx="0" cy="0"/>
+        </a:xfrm>
+      </p:grpSpPr>
     </p:spTree>
     <p:extLst>
       <p:ext uri="{BB962C8B-B14F-4D97-AF65-F5344CB8AC3E}">

</xml_diff>